<commit_message>
obstacles size check & reduce random placement range
</commit_message>
<xml_diff>
--- a/2DGP_2022182014박기란_2차발표.pptx
+++ b/2DGP_2022182014박기란_2차발표.pptx
@@ -6,9 +6,9 @@
   </p:sldMasterIdLst>
   <p:sldIdLst>
     <p:sldId id="261" r:id="rId2"/>
-    <p:sldId id="268" r:id="rId3"/>
+    <p:sldId id="269" r:id="rId3"/>
     <p:sldId id="265" r:id="rId4"/>
-    <p:sldId id="269" r:id="rId5"/>
+    <p:sldId id="270" r:id="rId5"/>
   </p:sldIdLst>
   <p:sldSz cx="12192000" cy="6858000"/>
   <p:notesSz cx="6858000" cy="9144000"/>
@@ -262,7 +262,7 @@
           <a:p>
             <a:fld id="{9C3DD876-8520-420A-8928-FB089BD9EB46}" type="datetimeFigureOut">
               <a:rPr lang="ko-KR" altLang="en-US" smtClean="0"/>
-              <a:t>2023-11-12</a:t>
+              <a:t>2023-11-14</a:t>
             </a:fld>
             <a:endParaRPr lang="ko-KR" altLang="en-US"/>
           </a:p>
@@ -460,7 +460,7 @@
           <a:p>
             <a:fld id="{9C3DD876-8520-420A-8928-FB089BD9EB46}" type="datetimeFigureOut">
               <a:rPr lang="ko-KR" altLang="en-US" smtClean="0"/>
-              <a:t>2023-11-12</a:t>
+              <a:t>2023-11-14</a:t>
             </a:fld>
             <a:endParaRPr lang="ko-KR" altLang="en-US"/>
           </a:p>
@@ -668,7 +668,7 @@
           <a:p>
             <a:fld id="{9C3DD876-8520-420A-8928-FB089BD9EB46}" type="datetimeFigureOut">
               <a:rPr lang="ko-KR" altLang="en-US" smtClean="0"/>
-              <a:t>2023-11-12</a:t>
+              <a:t>2023-11-14</a:t>
             </a:fld>
             <a:endParaRPr lang="ko-KR" altLang="en-US"/>
           </a:p>
@@ -866,7 +866,7 @@
           <a:p>
             <a:fld id="{9C3DD876-8520-420A-8928-FB089BD9EB46}" type="datetimeFigureOut">
               <a:rPr lang="ko-KR" altLang="en-US" smtClean="0"/>
-              <a:t>2023-11-12</a:t>
+              <a:t>2023-11-14</a:t>
             </a:fld>
             <a:endParaRPr lang="ko-KR" altLang="en-US"/>
           </a:p>
@@ -1141,7 +1141,7 @@
           <a:p>
             <a:fld id="{9C3DD876-8520-420A-8928-FB089BD9EB46}" type="datetimeFigureOut">
               <a:rPr lang="ko-KR" altLang="en-US" smtClean="0"/>
-              <a:t>2023-11-12</a:t>
+              <a:t>2023-11-14</a:t>
             </a:fld>
             <a:endParaRPr lang="ko-KR" altLang="en-US"/>
           </a:p>
@@ -1406,7 +1406,7 @@
           <a:p>
             <a:fld id="{9C3DD876-8520-420A-8928-FB089BD9EB46}" type="datetimeFigureOut">
               <a:rPr lang="ko-KR" altLang="en-US" smtClean="0"/>
-              <a:t>2023-11-12</a:t>
+              <a:t>2023-11-14</a:t>
             </a:fld>
             <a:endParaRPr lang="ko-KR" altLang="en-US"/>
           </a:p>
@@ -1818,7 +1818,7 @@
           <a:p>
             <a:fld id="{9C3DD876-8520-420A-8928-FB089BD9EB46}" type="datetimeFigureOut">
               <a:rPr lang="ko-KR" altLang="en-US" smtClean="0"/>
-              <a:t>2023-11-12</a:t>
+              <a:t>2023-11-14</a:t>
             </a:fld>
             <a:endParaRPr lang="ko-KR" altLang="en-US"/>
           </a:p>
@@ -1959,7 +1959,7 @@
           <a:p>
             <a:fld id="{9C3DD876-8520-420A-8928-FB089BD9EB46}" type="datetimeFigureOut">
               <a:rPr lang="ko-KR" altLang="en-US" smtClean="0"/>
-              <a:t>2023-11-12</a:t>
+              <a:t>2023-11-14</a:t>
             </a:fld>
             <a:endParaRPr lang="ko-KR" altLang="en-US"/>
           </a:p>
@@ -2072,7 +2072,7 @@
           <a:p>
             <a:fld id="{9C3DD876-8520-420A-8928-FB089BD9EB46}" type="datetimeFigureOut">
               <a:rPr lang="ko-KR" altLang="en-US" smtClean="0"/>
-              <a:t>2023-11-12</a:t>
+              <a:t>2023-11-14</a:t>
             </a:fld>
             <a:endParaRPr lang="ko-KR" altLang="en-US"/>
           </a:p>
@@ -2383,7 +2383,7 @@
           <a:p>
             <a:fld id="{9C3DD876-8520-420A-8928-FB089BD9EB46}" type="datetimeFigureOut">
               <a:rPr lang="ko-KR" altLang="en-US" smtClean="0"/>
-              <a:t>2023-11-12</a:t>
+              <a:t>2023-11-14</a:t>
             </a:fld>
             <a:endParaRPr lang="ko-KR" altLang="en-US"/>
           </a:p>
@@ -2671,7 +2671,7 @@
           <a:p>
             <a:fld id="{9C3DD876-8520-420A-8928-FB089BD9EB46}" type="datetimeFigureOut">
               <a:rPr lang="ko-KR" altLang="en-US" smtClean="0"/>
-              <a:t>2023-11-12</a:t>
+              <a:t>2023-11-14</a:t>
             </a:fld>
             <a:endParaRPr lang="ko-KR" altLang="en-US"/>
           </a:p>
@@ -2912,7 +2912,7 @@
           <a:p>
             <a:fld id="{9C3DD876-8520-420A-8928-FB089BD9EB46}" type="datetimeFigureOut">
               <a:rPr lang="ko-KR" altLang="en-US" smtClean="0"/>
-              <a:t>2023-11-12</a:t>
+              <a:t>2023-11-14</a:t>
             </a:fld>
             <a:endParaRPr lang="ko-KR" altLang="en-US"/>
           </a:p>
@@ -3640,7 +3640,7 @@
         <p:spPr>
           <a:xfrm>
             <a:off x="295565" y="193965"/>
-            <a:ext cx="6175088" cy="646331"/>
+            <a:ext cx="7568097" cy="646331"/>
           </a:xfrm>
           <a:prstGeom prst="rect">
             <a:avLst/>
@@ -3658,12 +3658,29 @@
                 <a:latin typeface="에스코어 드림 8 Heavy" panose="020B0903030302020204" pitchFamily="34" charset="-127"/>
                 <a:ea typeface="에스코어 드림 8 Heavy" panose="020B0903030302020204" pitchFamily="34" charset="-127"/>
               </a:rPr>
-              <a:t>개발 계획 대비 현재 진행 상황</a:t>
-            </a:r>
-            <a:endParaRPr lang="en-US" altLang="ko-KR" sz="3600" dirty="0">
-              <a:latin typeface="에스코어 드림 8 Heavy" panose="020B0903030302020204" pitchFamily="34" charset="-127"/>
-              <a:ea typeface="에스코어 드림 8 Heavy" panose="020B0903030302020204" pitchFamily="34" charset="-127"/>
-            </a:endParaRPr>
+              <a:t>프로젝트 개발 진행 상황 </a:t>
+            </a:r>
+            <a:r>
+              <a:rPr lang="en-US" altLang="ko-KR" sz="3600" dirty="0">
+                <a:latin typeface="에스코어 드림 8 Heavy" panose="020B0903030302020204" pitchFamily="34" charset="-127"/>
+                <a:ea typeface="에스코어 드림 8 Heavy" panose="020B0903030302020204" pitchFamily="34" charset="-127"/>
+              </a:rPr>
+              <a:t>– </a:t>
+            </a:r>
+            <a:r>
+              <a:rPr lang="ko-KR" altLang="en-US" sz="3600" dirty="0">
+                <a:latin typeface="에스코어 드림 8 Heavy" panose="020B0903030302020204" pitchFamily="34" charset="-127"/>
+                <a:ea typeface="에스코어 드림 8 Heavy" panose="020B0903030302020204" pitchFamily="34" charset="-127"/>
+              </a:rPr>
+              <a:t>평균 </a:t>
+            </a:r>
+            <a:r>
+              <a:rPr lang="en-US" altLang="ko-KR" sz="3600" dirty="0">
+                <a:latin typeface="에스코어 드림 8 Heavy" panose="020B0903030302020204" pitchFamily="34" charset="-127"/>
+                <a:ea typeface="에스코어 드림 8 Heavy" panose="020B0903030302020204" pitchFamily="34" charset="-127"/>
+              </a:rPr>
+              <a:t>70%</a:t>
+            </a:r>
           </a:p>
         </p:txBody>
       </p:sp>
@@ -3721,2057 +3738,6 @@
           </a:p>
         </p:txBody>
       </p:sp>
-      <p:sp>
-        <p:nvSpPr>
-          <p:cNvPr id="5" name="TextBox 4">
-            <a:extLst>
-              <a:ext uri="{FF2B5EF4-FFF2-40B4-BE49-F238E27FC236}">
-                <a16:creationId xmlns:a16="http://schemas.microsoft.com/office/drawing/2014/main" id="{C9C261BA-0487-E81C-223D-A3CAB3F855B9}"/>
-              </a:ext>
-            </a:extLst>
-          </p:cNvPr>
-          <p:cNvSpPr txBox="1"/>
-          <p:nvPr/>
-        </p:nvSpPr>
-        <p:spPr>
-          <a:xfrm>
-            <a:off x="3123583" y="1798745"/>
-            <a:ext cx="1994457" cy="461665"/>
-          </a:xfrm>
-          <a:prstGeom prst="rect">
-            <a:avLst/>
-          </a:prstGeom>
-          <a:noFill/>
-        </p:spPr>
-        <p:txBody>
-          <a:bodyPr wrap="none" rtlCol="0">
-            <a:spAutoFit/>
-          </a:bodyPr>
-          <a:lstStyle/>
-          <a:p>
-            <a:r>
-              <a:rPr lang="ko-KR" altLang="en-US" sz="2400" dirty="0">
-                <a:latin typeface="에스코어 드림 3 Light" panose="020B0303030302020204" pitchFamily="34" charset="-127"/>
-                <a:ea typeface="에스코어 드림 3 Light" panose="020B0303030302020204" pitchFamily="34" charset="-127"/>
-              </a:rPr>
-              <a:t>스포츠 </a:t>
-            </a:r>
-            <a:r>
-              <a:rPr lang="en-US" altLang="ko-KR" sz="2400" dirty="0">
-                <a:latin typeface="에스코어 드림 3 Light" panose="020B0303030302020204" pitchFamily="34" charset="-127"/>
-                <a:ea typeface="에스코어 드림 3 Light" panose="020B0303030302020204" pitchFamily="34" charset="-127"/>
-              </a:rPr>
-              <a:t>–</a:t>
-            </a:r>
-            <a:r>
-              <a:rPr lang="ko-KR" altLang="en-US" sz="2400" dirty="0">
-                <a:latin typeface="에스코어 드림 3 Light" panose="020B0303030302020204" pitchFamily="34" charset="-127"/>
-                <a:ea typeface="에스코어 드림 3 Light" panose="020B0303030302020204" pitchFamily="34" charset="-127"/>
-              </a:rPr>
-              <a:t> 스키</a:t>
-            </a:r>
-            <a:endParaRPr lang="en-US" altLang="ko-KR" sz="2400" dirty="0">
-              <a:latin typeface="에스코어 드림 3 Light" panose="020B0303030302020204" pitchFamily="34" charset="-127"/>
-              <a:ea typeface="에스코어 드림 3 Light" panose="020B0303030302020204" pitchFamily="34" charset="-127"/>
-            </a:endParaRPr>
-          </a:p>
-        </p:txBody>
-      </p:sp>
-      <p:sp>
-        <p:nvSpPr>
-          <p:cNvPr id="4" name="타원 3">
-            <a:extLst>
-              <a:ext uri="{FF2B5EF4-FFF2-40B4-BE49-F238E27FC236}">
-                <a16:creationId xmlns:a16="http://schemas.microsoft.com/office/drawing/2014/main" id="{C453EEDB-3C26-0E1F-B932-D1E07BE34AA6}"/>
-              </a:ext>
-            </a:extLst>
-          </p:cNvPr>
-          <p:cNvSpPr/>
-          <p:nvPr/>
-        </p:nvSpPr>
-        <p:spPr>
-          <a:xfrm>
-            <a:off x="897947" y="1136168"/>
-            <a:ext cx="180000" cy="180000"/>
-          </a:xfrm>
-          <a:prstGeom prst="ellipse">
-            <a:avLst/>
-          </a:prstGeom>
-          <a:solidFill>
-            <a:schemeClr val="bg1">
-              <a:lumMod val="75000"/>
-            </a:schemeClr>
-          </a:solidFill>
-          <a:ln>
-            <a:solidFill>
-              <a:schemeClr val="bg1">
-                <a:lumMod val="75000"/>
-              </a:schemeClr>
-            </a:solidFill>
-          </a:ln>
-        </p:spPr>
-        <p:style>
-          <a:lnRef idx="2">
-            <a:schemeClr val="accent1">
-              <a:shade val="15000"/>
-            </a:schemeClr>
-          </a:lnRef>
-          <a:fillRef idx="1">
-            <a:schemeClr val="accent1"/>
-          </a:fillRef>
-          <a:effectRef idx="0">
-            <a:schemeClr val="accent1"/>
-          </a:effectRef>
-          <a:fontRef idx="minor">
-            <a:schemeClr val="lt1"/>
-          </a:fontRef>
-        </p:style>
-        <p:txBody>
-          <a:bodyPr rtlCol="0" anchor="ctr"/>
-          <a:lstStyle/>
-          <a:p>
-            <a:pPr algn="ctr"/>
-            <a:endParaRPr lang="ko-KR" altLang="en-US"/>
-          </a:p>
-        </p:txBody>
-      </p:sp>
-      <p:sp>
-        <p:nvSpPr>
-          <p:cNvPr id="7" name="TextBox 6">
-            <a:extLst>
-              <a:ext uri="{FF2B5EF4-FFF2-40B4-BE49-F238E27FC236}">
-                <a16:creationId xmlns:a16="http://schemas.microsoft.com/office/drawing/2014/main" id="{17139E08-949B-11CC-8177-6D3461539594}"/>
-              </a:ext>
-            </a:extLst>
-          </p:cNvPr>
-          <p:cNvSpPr txBox="1"/>
-          <p:nvPr/>
-        </p:nvSpPr>
-        <p:spPr>
-          <a:xfrm>
-            <a:off x="1166500" y="995335"/>
-            <a:ext cx="1454244" cy="461665"/>
-          </a:xfrm>
-          <a:prstGeom prst="rect">
-            <a:avLst/>
-          </a:prstGeom>
-          <a:noFill/>
-        </p:spPr>
-        <p:txBody>
-          <a:bodyPr wrap="none" rtlCol="0">
-            <a:spAutoFit/>
-          </a:bodyPr>
-          <a:lstStyle/>
-          <a:p>
-            <a:r>
-              <a:rPr lang="ko-KR" altLang="en-US" sz="2400" dirty="0">
-                <a:latin typeface="에스코어 드림 4 Regular" panose="020B0503030302020204" pitchFamily="34" charset="-127"/>
-                <a:ea typeface="에스코어 드림 4 Regular" panose="020B0503030302020204" pitchFamily="34" charset="-127"/>
-              </a:rPr>
-              <a:t>게임 장르</a:t>
-            </a:r>
-          </a:p>
-        </p:txBody>
-      </p:sp>
-      <p:pic>
-        <p:nvPicPr>
-          <p:cNvPr id="8" name="그림 7">
-            <a:extLst>
-              <a:ext uri="{FF2B5EF4-FFF2-40B4-BE49-F238E27FC236}">
-                <a16:creationId xmlns:a16="http://schemas.microsoft.com/office/drawing/2014/main" id="{70326711-8C54-1E2B-0D3F-39F4E0458791}"/>
-              </a:ext>
-            </a:extLst>
-          </p:cNvPr>
-          <p:cNvPicPr>
-            <a:picLocks noChangeAspect="1"/>
-          </p:cNvPicPr>
-          <p:nvPr/>
-        </p:nvPicPr>
-        <p:blipFill>
-          <a:blip r:embed="rId2">
-            <a:extLst>
-              <a:ext uri="{28A0092B-C50C-407E-A947-70E740481C1C}">
-                <a14:useLocalDpi xmlns:a14="http://schemas.microsoft.com/office/drawing/2010/main" val="0"/>
-              </a:ext>
-            </a:extLst>
-          </a:blip>
-          <a:stretch>
-            <a:fillRect/>
-          </a:stretch>
-        </p:blipFill>
-        <p:spPr>
-          <a:xfrm>
-            <a:off x="987947" y="1470891"/>
-            <a:ext cx="1958109" cy="1958109"/>
-          </a:xfrm>
-          <a:prstGeom prst="rect">
-            <a:avLst/>
-          </a:prstGeom>
-        </p:spPr>
-      </p:pic>
-      <p:sp>
-        <p:nvSpPr>
-          <p:cNvPr id="16" name="TextBox 15">
-            <a:extLst>
-              <a:ext uri="{FF2B5EF4-FFF2-40B4-BE49-F238E27FC236}">
-                <a16:creationId xmlns:a16="http://schemas.microsoft.com/office/drawing/2014/main" id="{E54B3E22-1767-FD97-2664-2C26EDC38649}"/>
-              </a:ext>
-            </a:extLst>
-          </p:cNvPr>
-          <p:cNvSpPr txBox="1"/>
-          <p:nvPr/>
-        </p:nvSpPr>
-        <p:spPr>
-          <a:xfrm>
-            <a:off x="3123583" y="2409741"/>
-            <a:ext cx="1524776" cy="400110"/>
-          </a:xfrm>
-          <a:prstGeom prst="rect">
-            <a:avLst/>
-          </a:prstGeom>
-          <a:noFill/>
-        </p:spPr>
-        <p:txBody>
-          <a:bodyPr wrap="none" rtlCol="0">
-            <a:spAutoFit/>
-          </a:bodyPr>
-          <a:lstStyle/>
-          <a:p>
-            <a:r>
-              <a:rPr lang="ko-KR" altLang="en-US" sz="2000" dirty="0">
-                <a:latin typeface="에스코어 드림 3 Light" panose="020B0303030302020204" pitchFamily="34" charset="-127"/>
-                <a:ea typeface="에스코어 드림 3 Light" panose="020B0303030302020204" pitchFamily="34" charset="-127"/>
-              </a:rPr>
-              <a:t>시점 </a:t>
-            </a:r>
-            <a:r>
-              <a:rPr lang="en-US" altLang="ko-KR" sz="2000" dirty="0">
-                <a:latin typeface="에스코어 드림 3 Light" panose="020B0303030302020204" pitchFamily="34" charset="-127"/>
-                <a:ea typeface="에스코어 드림 3 Light" panose="020B0303030302020204" pitchFamily="34" charset="-127"/>
-              </a:rPr>
-              <a:t>– </a:t>
-            </a:r>
-            <a:r>
-              <a:rPr lang="ko-KR" altLang="en-US" sz="2000" dirty="0">
-                <a:latin typeface="에스코어 드림 3 Light" panose="020B0303030302020204" pitchFamily="34" charset="-127"/>
-                <a:ea typeface="에스코어 드림 3 Light" panose="020B0303030302020204" pitchFamily="34" charset="-127"/>
-              </a:rPr>
-              <a:t>탑 뷰</a:t>
-            </a:r>
-            <a:endParaRPr lang="en-US" altLang="ko-KR" sz="2000" dirty="0">
-              <a:latin typeface="에스코어 드림 3 Light" panose="020B0303030302020204" pitchFamily="34" charset="-127"/>
-              <a:ea typeface="에스코어 드림 3 Light" panose="020B0303030302020204" pitchFamily="34" charset="-127"/>
-            </a:endParaRPr>
-          </a:p>
-        </p:txBody>
-      </p:sp>
-      <p:sp>
-        <p:nvSpPr>
-          <p:cNvPr id="17" name="타원 16">
-            <a:extLst>
-              <a:ext uri="{FF2B5EF4-FFF2-40B4-BE49-F238E27FC236}">
-                <a16:creationId xmlns:a16="http://schemas.microsoft.com/office/drawing/2014/main" id="{76B7FC17-B416-DEA5-E163-E04E2EEE4305}"/>
-              </a:ext>
-            </a:extLst>
-          </p:cNvPr>
-          <p:cNvSpPr/>
-          <p:nvPr/>
-        </p:nvSpPr>
-        <p:spPr>
-          <a:xfrm>
-            <a:off x="6017533" y="1133766"/>
-            <a:ext cx="180000" cy="180000"/>
-          </a:xfrm>
-          <a:prstGeom prst="ellipse">
-            <a:avLst/>
-          </a:prstGeom>
-          <a:solidFill>
-            <a:schemeClr val="bg1">
-              <a:lumMod val="75000"/>
-            </a:schemeClr>
-          </a:solidFill>
-          <a:ln>
-            <a:solidFill>
-              <a:schemeClr val="bg1">
-                <a:lumMod val="75000"/>
-              </a:schemeClr>
-            </a:solidFill>
-          </a:ln>
-        </p:spPr>
-        <p:style>
-          <a:lnRef idx="2">
-            <a:schemeClr val="accent1">
-              <a:shade val="15000"/>
-            </a:schemeClr>
-          </a:lnRef>
-          <a:fillRef idx="1">
-            <a:schemeClr val="accent1"/>
-          </a:fillRef>
-          <a:effectRef idx="0">
-            <a:schemeClr val="accent1"/>
-          </a:effectRef>
-          <a:fontRef idx="minor">
-            <a:schemeClr val="lt1"/>
-          </a:fontRef>
-        </p:style>
-        <p:txBody>
-          <a:bodyPr rtlCol="0" anchor="ctr"/>
-          <a:lstStyle/>
-          <a:p>
-            <a:pPr algn="ctr"/>
-            <a:endParaRPr lang="ko-KR" altLang="en-US"/>
-          </a:p>
-        </p:txBody>
-      </p:sp>
-      <p:sp>
-        <p:nvSpPr>
-          <p:cNvPr id="18" name="TextBox 17">
-            <a:extLst>
-              <a:ext uri="{FF2B5EF4-FFF2-40B4-BE49-F238E27FC236}">
-                <a16:creationId xmlns:a16="http://schemas.microsoft.com/office/drawing/2014/main" id="{4D6B1063-3586-B7D9-685E-018BA3831E17}"/>
-              </a:ext>
-            </a:extLst>
-          </p:cNvPr>
-          <p:cNvSpPr txBox="1"/>
-          <p:nvPr/>
-        </p:nvSpPr>
-        <p:spPr>
-          <a:xfrm>
-            <a:off x="6286086" y="992933"/>
-            <a:ext cx="2723823" cy="461665"/>
-          </a:xfrm>
-          <a:prstGeom prst="rect">
-            <a:avLst/>
-          </a:prstGeom>
-          <a:noFill/>
-        </p:spPr>
-        <p:txBody>
-          <a:bodyPr wrap="none" rtlCol="0">
-            <a:spAutoFit/>
-          </a:bodyPr>
-          <a:lstStyle/>
-          <a:p>
-            <a:r>
-              <a:rPr lang="ko-KR" altLang="en-US" sz="2400" dirty="0">
-                <a:latin typeface="에스코어 드림 4 Regular" panose="020B0503030302020204" pitchFamily="34" charset="-127"/>
-                <a:ea typeface="에스코어 드림 4 Regular" panose="020B0503030302020204" pitchFamily="34" charset="-127"/>
-              </a:rPr>
-              <a:t>게임 핵심 메커니즘</a:t>
-            </a:r>
-          </a:p>
-        </p:txBody>
-      </p:sp>
-      <p:sp>
-        <p:nvSpPr>
-          <p:cNvPr id="21" name="타원 20">
-            <a:extLst>
-              <a:ext uri="{FF2B5EF4-FFF2-40B4-BE49-F238E27FC236}">
-                <a16:creationId xmlns:a16="http://schemas.microsoft.com/office/drawing/2014/main" id="{53C4D5DD-147F-5F47-2B77-6A1FDB74B2E3}"/>
-              </a:ext>
-            </a:extLst>
-          </p:cNvPr>
-          <p:cNvSpPr/>
-          <p:nvPr/>
-        </p:nvSpPr>
-        <p:spPr>
-          <a:xfrm>
-            <a:off x="897947" y="3657609"/>
-            <a:ext cx="180000" cy="180000"/>
-          </a:xfrm>
-          <a:prstGeom prst="ellipse">
-            <a:avLst/>
-          </a:prstGeom>
-          <a:solidFill>
-            <a:schemeClr val="bg1">
-              <a:lumMod val="75000"/>
-            </a:schemeClr>
-          </a:solidFill>
-          <a:ln>
-            <a:solidFill>
-              <a:schemeClr val="bg1">
-                <a:lumMod val="75000"/>
-              </a:schemeClr>
-            </a:solidFill>
-          </a:ln>
-        </p:spPr>
-        <p:style>
-          <a:lnRef idx="2">
-            <a:schemeClr val="accent1">
-              <a:shade val="15000"/>
-            </a:schemeClr>
-          </a:lnRef>
-          <a:fillRef idx="1">
-            <a:schemeClr val="accent1"/>
-          </a:fillRef>
-          <a:effectRef idx="0">
-            <a:schemeClr val="accent1"/>
-          </a:effectRef>
-          <a:fontRef idx="minor">
-            <a:schemeClr val="lt1"/>
-          </a:fontRef>
-        </p:style>
-        <p:txBody>
-          <a:bodyPr rtlCol="0" anchor="ctr"/>
-          <a:lstStyle/>
-          <a:p>
-            <a:pPr algn="ctr"/>
-            <a:endParaRPr lang="ko-KR" altLang="en-US"/>
-          </a:p>
-        </p:txBody>
-      </p:sp>
-      <p:sp>
-        <p:nvSpPr>
-          <p:cNvPr id="22" name="TextBox 21">
-            <a:extLst>
-              <a:ext uri="{FF2B5EF4-FFF2-40B4-BE49-F238E27FC236}">
-                <a16:creationId xmlns:a16="http://schemas.microsoft.com/office/drawing/2014/main" id="{C54634E7-BC4D-B98D-0078-71F6CB8DE549}"/>
-              </a:ext>
-            </a:extLst>
-          </p:cNvPr>
-          <p:cNvSpPr txBox="1"/>
-          <p:nvPr/>
-        </p:nvSpPr>
-        <p:spPr>
-          <a:xfrm>
-            <a:off x="1166500" y="3516776"/>
-            <a:ext cx="1454244" cy="461665"/>
-          </a:xfrm>
-          <a:prstGeom prst="rect">
-            <a:avLst/>
-          </a:prstGeom>
-          <a:noFill/>
-        </p:spPr>
-        <p:txBody>
-          <a:bodyPr wrap="none" rtlCol="0">
-            <a:spAutoFit/>
-          </a:bodyPr>
-          <a:lstStyle/>
-          <a:p>
-            <a:r>
-              <a:rPr lang="ko-KR" altLang="en-US" sz="2400" dirty="0">
-                <a:latin typeface="에스코어 드림 4 Regular" panose="020B0503030302020204" pitchFamily="34" charset="-127"/>
-                <a:ea typeface="에스코어 드림 4 Regular" panose="020B0503030302020204" pitchFamily="34" charset="-127"/>
-              </a:rPr>
-              <a:t>게임 모드</a:t>
-            </a:r>
-          </a:p>
-        </p:txBody>
-      </p:sp>
-      <p:sp>
-        <p:nvSpPr>
-          <p:cNvPr id="23" name="TextBox 22">
-            <a:extLst>
-              <a:ext uri="{FF2B5EF4-FFF2-40B4-BE49-F238E27FC236}">
-                <a16:creationId xmlns:a16="http://schemas.microsoft.com/office/drawing/2014/main" id="{5DAACF57-3CD1-B0D4-F690-8A0703AD549F}"/>
-              </a:ext>
-            </a:extLst>
-          </p:cNvPr>
-          <p:cNvSpPr txBox="1"/>
-          <p:nvPr/>
-        </p:nvSpPr>
-        <p:spPr>
-          <a:xfrm>
-            <a:off x="2837287" y="3578331"/>
-            <a:ext cx="2457724" cy="400110"/>
-          </a:xfrm>
-          <a:prstGeom prst="rect">
-            <a:avLst/>
-          </a:prstGeom>
-          <a:noFill/>
-        </p:spPr>
-        <p:txBody>
-          <a:bodyPr wrap="none" rtlCol="0">
-            <a:spAutoFit/>
-          </a:bodyPr>
-          <a:lstStyle/>
-          <a:p>
-            <a:r>
-              <a:rPr lang="ko-KR" altLang="en-US" sz="2000" dirty="0">
-                <a:solidFill>
-                  <a:schemeClr val="bg1">
-                    <a:lumMod val="50000"/>
-                  </a:schemeClr>
-                </a:solidFill>
-                <a:latin typeface="에스코어 드림 3 Light" panose="020B0303030302020204" pitchFamily="34" charset="-127"/>
-                <a:ea typeface="에스코어 드림 3 Light" panose="020B0303030302020204" pitchFamily="34" charset="-127"/>
-              </a:rPr>
-              <a:t>일반 모드</a:t>
-            </a:r>
-            <a:r>
-              <a:rPr lang="en-US" altLang="ko-KR" sz="2000" dirty="0">
-                <a:solidFill>
-                  <a:schemeClr val="bg1">
-                    <a:lumMod val="50000"/>
-                  </a:schemeClr>
-                </a:solidFill>
-                <a:latin typeface="에스코어 드림 3 Light" panose="020B0303030302020204" pitchFamily="34" charset="-127"/>
-                <a:ea typeface="에스코어 드림 3 Light" panose="020B0303030302020204" pitchFamily="34" charset="-127"/>
-              </a:rPr>
-              <a:t>, </a:t>
-            </a:r>
-            <a:r>
-              <a:rPr lang="ko-KR" altLang="en-US" sz="2000" dirty="0">
-                <a:solidFill>
-                  <a:schemeClr val="bg1">
-                    <a:lumMod val="50000"/>
-                  </a:schemeClr>
-                </a:solidFill>
-                <a:latin typeface="에스코어 드림 3 Light" panose="020B0303030302020204" pitchFamily="34" charset="-127"/>
-                <a:ea typeface="에스코어 드림 3 Light" panose="020B0303030302020204" pitchFamily="34" charset="-127"/>
-              </a:rPr>
-              <a:t>무한 모드</a:t>
-            </a:r>
-            <a:endParaRPr lang="en-US" altLang="ko-KR" sz="2000" dirty="0">
-              <a:solidFill>
-                <a:schemeClr val="bg1">
-                  <a:lumMod val="50000"/>
-                </a:schemeClr>
-              </a:solidFill>
-              <a:latin typeface="에스코어 드림 3 Light" panose="020B0303030302020204" pitchFamily="34" charset="-127"/>
-              <a:ea typeface="에스코어 드림 3 Light" panose="020B0303030302020204" pitchFamily="34" charset="-127"/>
-            </a:endParaRPr>
-          </a:p>
-        </p:txBody>
-      </p:sp>
-      <p:sp>
-        <p:nvSpPr>
-          <p:cNvPr id="24" name="TextBox 23">
-            <a:extLst>
-              <a:ext uri="{FF2B5EF4-FFF2-40B4-BE49-F238E27FC236}">
-                <a16:creationId xmlns:a16="http://schemas.microsoft.com/office/drawing/2014/main" id="{E3D4FDE2-52ED-B2DF-EA0F-921EFC30A898}"/>
-              </a:ext>
-            </a:extLst>
-          </p:cNvPr>
-          <p:cNvSpPr txBox="1"/>
-          <p:nvPr/>
-        </p:nvSpPr>
-        <p:spPr>
-          <a:xfrm>
-            <a:off x="6286086" y="1522490"/>
-            <a:ext cx="2380780" cy="400110"/>
-          </a:xfrm>
-          <a:prstGeom prst="rect">
-            <a:avLst/>
-          </a:prstGeom>
-          <a:noFill/>
-        </p:spPr>
-        <p:txBody>
-          <a:bodyPr wrap="none" rtlCol="0">
-            <a:spAutoFit/>
-          </a:bodyPr>
-          <a:lstStyle/>
-          <a:p>
-            <a:r>
-              <a:rPr lang="ko-KR" altLang="en-US" sz="2000" dirty="0">
-                <a:latin typeface="에스코어 드림 3 Light" panose="020B0303030302020204" pitchFamily="34" charset="-127"/>
-                <a:ea typeface="에스코어 드림 3 Light" panose="020B0303030302020204" pitchFamily="34" charset="-127"/>
-              </a:rPr>
-              <a:t>일반 모드 진행 방식</a:t>
-            </a:r>
-            <a:endParaRPr lang="en-US" altLang="ko-KR" sz="2000" dirty="0">
-              <a:latin typeface="에스코어 드림 3 Light" panose="020B0303030302020204" pitchFamily="34" charset="-127"/>
-              <a:ea typeface="에스코어 드림 3 Light" panose="020B0303030302020204" pitchFamily="34" charset="-127"/>
-            </a:endParaRPr>
-          </a:p>
-        </p:txBody>
-      </p:sp>
-      <p:sp>
-        <p:nvSpPr>
-          <p:cNvPr id="25" name="TextBox 24">
-            <a:extLst>
-              <a:ext uri="{FF2B5EF4-FFF2-40B4-BE49-F238E27FC236}">
-                <a16:creationId xmlns:a16="http://schemas.microsoft.com/office/drawing/2014/main" id="{E7245F96-0154-34CA-8BB1-40B37717A928}"/>
-              </a:ext>
-            </a:extLst>
-          </p:cNvPr>
-          <p:cNvSpPr txBox="1"/>
-          <p:nvPr/>
-        </p:nvSpPr>
-        <p:spPr>
-          <a:xfrm>
-            <a:off x="6507758" y="1922600"/>
-            <a:ext cx="4416594" cy="369332"/>
-          </a:xfrm>
-          <a:prstGeom prst="rect">
-            <a:avLst/>
-          </a:prstGeom>
-          <a:noFill/>
-        </p:spPr>
-        <p:txBody>
-          <a:bodyPr wrap="none" rtlCol="0">
-            <a:spAutoFit/>
-          </a:bodyPr>
-          <a:lstStyle/>
-          <a:p>
-            <a:r>
-              <a:rPr lang="ko-KR" altLang="en-US" dirty="0">
-                <a:latin typeface="에스코어 드림 3 Light" panose="020B0303030302020204" pitchFamily="34" charset="-127"/>
-                <a:ea typeface="에스코어 드림 3 Light" panose="020B0303030302020204" pitchFamily="34" charset="-127"/>
-              </a:rPr>
-              <a:t>장애물을 피해 도착지점 도달 시 게임 종료 </a:t>
-            </a:r>
-            <a:endParaRPr lang="en-US" altLang="ko-KR" dirty="0">
-              <a:latin typeface="에스코어 드림 3 Light" panose="020B0303030302020204" pitchFamily="34" charset="-127"/>
-              <a:ea typeface="에스코어 드림 3 Light" panose="020B0303030302020204" pitchFamily="34" charset="-127"/>
-            </a:endParaRPr>
-          </a:p>
-        </p:txBody>
-      </p:sp>
-      <p:sp>
-        <p:nvSpPr>
-          <p:cNvPr id="26" name="TextBox 25">
-            <a:extLst>
-              <a:ext uri="{FF2B5EF4-FFF2-40B4-BE49-F238E27FC236}">
-                <a16:creationId xmlns:a16="http://schemas.microsoft.com/office/drawing/2014/main" id="{2D2DE00B-451F-4AEE-977A-1F0C95CB4B43}"/>
-              </a:ext>
-            </a:extLst>
-          </p:cNvPr>
-          <p:cNvSpPr txBox="1"/>
-          <p:nvPr/>
-        </p:nvSpPr>
-        <p:spPr>
-          <a:xfrm>
-            <a:off x="6286086" y="2407082"/>
-            <a:ext cx="2380780" cy="400110"/>
-          </a:xfrm>
-          <a:prstGeom prst="rect">
-            <a:avLst/>
-          </a:prstGeom>
-          <a:noFill/>
-        </p:spPr>
-        <p:txBody>
-          <a:bodyPr wrap="none" rtlCol="0">
-            <a:spAutoFit/>
-          </a:bodyPr>
-          <a:lstStyle/>
-          <a:p>
-            <a:r>
-              <a:rPr lang="ko-KR" altLang="en-US" sz="2000" dirty="0">
-                <a:latin typeface="에스코어 드림 3 Light" panose="020B0303030302020204" pitchFamily="34" charset="-127"/>
-                <a:ea typeface="에스코어 드림 3 Light" panose="020B0303030302020204" pitchFamily="34" charset="-127"/>
-              </a:rPr>
-              <a:t>무한 모드 진행 방식</a:t>
-            </a:r>
-            <a:endParaRPr lang="en-US" altLang="ko-KR" sz="2000" dirty="0">
-              <a:latin typeface="에스코어 드림 3 Light" panose="020B0303030302020204" pitchFamily="34" charset="-127"/>
-              <a:ea typeface="에스코어 드림 3 Light" panose="020B0303030302020204" pitchFamily="34" charset="-127"/>
-            </a:endParaRPr>
-          </a:p>
-        </p:txBody>
-      </p:sp>
-      <p:sp>
-        <p:nvSpPr>
-          <p:cNvPr id="27" name="TextBox 26">
-            <a:extLst>
-              <a:ext uri="{FF2B5EF4-FFF2-40B4-BE49-F238E27FC236}">
-                <a16:creationId xmlns:a16="http://schemas.microsoft.com/office/drawing/2014/main" id="{21E27224-351E-442D-5FB3-1CCAC8737140}"/>
-              </a:ext>
-            </a:extLst>
-          </p:cNvPr>
-          <p:cNvSpPr txBox="1"/>
-          <p:nvPr/>
-        </p:nvSpPr>
-        <p:spPr>
-          <a:xfrm>
-            <a:off x="6507758" y="2807192"/>
-            <a:ext cx="4180953" cy="369332"/>
-          </a:xfrm>
-          <a:prstGeom prst="rect">
-            <a:avLst/>
-          </a:prstGeom>
-          <a:noFill/>
-        </p:spPr>
-        <p:txBody>
-          <a:bodyPr wrap="none" rtlCol="0">
-            <a:spAutoFit/>
-          </a:bodyPr>
-          <a:lstStyle/>
-          <a:p>
-            <a:r>
-              <a:rPr lang="ko-KR" altLang="en-US" dirty="0">
-                <a:latin typeface="에스코어 드림 3 Light" panose="020B0303030302020204" pitchFamily="34" charset="-127"/>
-                <a:ea typeface="에스코어 드림 3 Light" panose="020B0303030302020204" pitchFamily="34" charset="-127"/>
-              </a:rPr>
-              <a:t>주어진 목숨 </a:t>
-            </a:r>
-            <a:r>
-              <a:rPr lang="en-US" altLang="ko-KR" dirty="0">
-                <a:latin typeface="에스코어 드림 3 Light" panose="020B0303030302020204" pitchFamily="34" charset="-127"/>
-                <a:ea typeface="에스코어 드림 3 Light" panose="020B0303030302020204" pitchFamily="34" charset="-127"/>
-              </a:rPr>
-              <a:t>3</a:t>
-            </a:r>
-            <a:r>
-              <a:rPr lang="ko-KR" altLang="en-US" dirty="0">
-                <a:latin typeface="에스코어 드림 3 Light" panose="020B0303030302020204" pitchFamily="34" charset="-127"/>
-                <a:ea typeface="에스코어 드림 3 Light" panose="020B0303030302020204" pitchFamily="34" charset="-127"/>
-              </a:rPr>
-              <a:t>개를 다 잃을 시 게임 종료 </a:t>
-            </a:r>
-            <a:endParaRPr lang="en-US" altLang="ko-KR" dirty="0">
-              <a:latin typeface="에스코어 드림 3 Light" panose="020B0303030302020204" pitchFamily="34" charset="-127"/>
-              <a:ea typeface="에스코어 드림 3 Light" panose="020B0303030302020204" pitchFamily="34" charset="-127"/>
-            </a:endParaRPr>
-          </a:p>
-        </p:txBody>
-      </p:sp>
-      <p:sp>
-        <p:nvSpPr>
-          <p:cNvPr id="28" name="TextBox 27">
-            <a:extLst>
-              <a:ext uri="{FF2B5EF4-FFF2-40B4-BE49-F238E27FC236}">
-                <a16:creationId xmlns:a16="http://schemas.microsoft.com/office/drawing/2014/main" id="{BFA10AE5-6A1E-192F-ECB3-93DBAC0F776D}"/>
-              </a:ext>
-            </a:extLst>
-          </p:cNvPr>
-          <p:cNvSpPr txBox="1"/>
-          <p:nvPr/>
-        </p:nvSpPr>
-        <p:spPr>
-          <a:xfrm>
-            <a:off x="6286086" y="3297836"/>
-            <a:ext cx="2066591" cy="400110"/>
-          </a:xfrm>
-          <a:prstGeom prst="rect">
-            <a:avLst/>
-          </a:prstGeom>
-          <a:noFill/>
-        </p:spPr>
-        <p:txBody>
-          <a:bodyPr wrap="none" rtlCol="0">
-            <a:spAutoFit/>
-          </a:bodyPr>
-          <a:lstStyle/>
-          <a:p>
-            <a:r>
-              <a:rPr lang="ko-KR" altLang="en-US" sz="2000" dirty="0">
-                <a:latin typeface="에스코어 드림 3 Light" panose="020B0303030302020204" pitchFamily="34" charset="-127"/>
-                <a:ea typeface="에스코어 드림 3 Light" panose="020B0303030302020204" pitchFamily="34" charset="-127"/>
-              </a:rPr>
-              <a:t>장애물 </a:t>
-            </a:r>
-            <a:r>
-              <a:rPr lang="en-US" altLang="ko-KR" sz="2000" dirty="0">
-                <a:latin typeface="에스코어 드림 3 Light" panose="020B0303030302020204" pitchFamily="34" charset="-127"/>
-                <a:ea typeface="에스코어 드림 3 Light" panose="020B0303030302020204" pitchFamily="34" charset="-127"/>
-              </a:rPr>
-              <a:t>(</a:t>
-            </a:r>
-            <a:r>
-              <a:rPr lang="ko-KR" altLang="en-US" sz="2000" dirty="0">
-                <a:latin typeface="에스코어 드림 3 Light" panose="020B0303030302020204" pitchFamily="34" charset="-127"/>
-                <a:ea typeface="에스코어 드림 3 Light" panose="020B0303030302020204" pitchFamily="34" charset="-127"/>
-              </a:rPr>
-              <a:t>돌</a:t>
-            </a:r>
-            <a:r>
-              <a:rPr lang="en-US" altLang="ko-KR" sz="2000" dirty="0">
-                <a:latin typeface="에스코어 드림 3 Light" panose="020B0303030302020204" pitchFamily="34" charset="-127"/>
-                <a:ea typeface="에스코어 드림 3 Light" panose="020B0303030302020204" pitchFamily="34" charset="-127"/>
-              </a:rPr>
-              <a:t>, </a:t>
-            </a:r>
-            <a:r>
-              <a:rPr lang="ko-KR" altLang="en-US" sz="2000" dirty="0">
-                <a:latin typeface="에스코어 드림 3 Light" panose="020B0303030302020204" pitchFamily="34" charset="-127"/>
-                <a:ea typeface="에스코어 드림 3 Light" panose="020B0303030302020204" pitchFamily="34" charset="-127"/>
-              </a:rPr>
-              <a:t>나무</a:t>
-            </a:r>
-            <a:r>
-              <a:rPr lang="en-US" altLang="ko-KR" sz="2000" dirty="0">
-                <a:latin typeface="에스코어 드림 3 Light" panose="020B0303030302020204" pitchFamily="34" charset="-127"/>
-                <a:ea typeface="에스코어 드림 3 Light" panose="020B0303030302020204" pitchFamily="34" charset="-127"/>
-              </a:rPr>
-              <a:t>)</a:t>
-            </a:r>
-          </a:p>
-        </p:txBody>
-      </p:sp>
-      <p:sp>
-        <p:nvSpPr>
-          <p:cNvPr id="29" name="TextBox 28">
-            <a:extLst>
-              <a:ext uri="{FF2B5EF4-FFF2-40B4-BE49-F238E27FC236}">
-                <a16:creationId xmlns:a16="http://schemas.microsoft.com/office/drawing/2014/main" id="{E8996633-8103-D33F-D500-483E9E11F2CC}"/>
-              </a:ext>
-            </a:extLst>
-          </p:cNvPr>
-          <p:cNvSpPr txBox="1"/>
-          <p:nvPr/>
-        </p:nvSpPr>
-        <p:spPr>
-          <a:xfrm>
-            <a:off x="6507758" y="3689088"/>
-            <a:ext cx="3895618" cy="369332"/>
-          </a:xfrm>
-          <a:prstGeom prst="rect">
-            <a:avLst/>
-          </a:prstGeom>
-          <a:noFill/>
-        </p:spPr>
-        <p:txBody>
-          <a:bodyPr wrap="none" rtlCol="0">
-            <a:spAutoFit/>
-          </a:bodyPr>
-          <a:lstStyle/>
-          <a:p>
-            <a:r>
-              <a:rPr lang="ko-KR" altLang="en-US" dirty="0">
-                <a:latin typeface="에스코어 드림 3 Light" panose="020B0303030302020204" pitchFamily="34" charset="-127"/>
-                <a:ea typeface="에스코어 드림 3 Light" panose="020B0303030302020204" pitchFamily="34" charset="-127"/>
-              </a:rPr>
-              <a:t>충돌 시 넘어지고</a:t>
-            </a:r>
-            <a:r>
-              <a:rPr lang="en-US" altLang="ko-KR" dirty="0">
-                <a:latin typeface="에스코어 드림 3 Light" panose="020B0303030302020204" pitchFamily="34" charset="-127"/>
-                <a:ea typeface="에스코어 드림 3 Light" panose="020B0303030302020204" pitchFamily="34" charset="-127"/>
-              </a:rPr>
-              <a:t>, 2</a:t>
-            </a:r>
-            <a:r>
-              <a:rPr lang="ko-KR" altLang="en-US" dirty="0">
-                <a:latin typeface="에스코어 드림 3 Light" panose="020B0303030302020204" pitchFamily="34" charset="-127"/>
-                <a:ea typeface="에스코어 드림 3 Light" panose="020B0303030302020204" pitchFamily="34" charset="-127"/>
-              </a:rPr>
-              <a:t>초 동안 기절 상태</a:t>
-            </a:r>
-            <a:endParaRPr lang="en-US" altLang="ko-KR" dirty="0">
-              <a:latin typeface="에스코어 드림 3 Light" panose="020B0303030302020204" pitchFamily="34" charset="-127"/>
-              <a:ea typeface="에스코어 드림 3 Light" panose="020B0303030302020204" pitchFamily="34" charset="-127"/>
-            </a:endParaRPr>
-          </a:p>
-        </p:txBody>
-      </p:sp>
-      <p:sp>
-        <p:nvSpPr>
-          <p:cNvPr id="30" name="TextBox 29">
-            <a:extLst>
-              <a:ext uri="{FF2B5EF4-FFF2-40B4-BE49-F238E27FC236}">
-                <a16:creationId xmlns:a16="http://schemas.microsoft.com/office/drawing/2014/main" id="{705DDC06-CD2C-52EA-2498-AF1AE8DF5DDF}"/>
-              </a:ext>
-            </a:extLst>
-          </p:cNvPr>
-          <p:cNvSpPr txBox="1"/>
-          <p:nvPr/>
-        </p:nvSpPr>
-        <p:spPr>
-          <a:xfrm>
-            <a:off x="6286086" y="4185873"/>
-            <a:ext cx="678391" cy="400110"/>
-          </a:xfrm>
-          <a:prstGeom prst="rect">
-            <a:avLst/>
-          </a:prstGeom>
-          <a:noFill/>
-        </p:spPr>
-        <p:txBody>
-          <a:bodyPr wrap="none" rtlCol="0">
-            <a:spAutoFit/>
-          </a:bodyPr>
-          <a:lstStyle/>
-          <a:p>
-            <a:r>
-              <a:rPr lang="ko-KR" altLang="en-US" sz="2000" dirty="0">
-                <a:latin typeface="에스코어 드림 3 Light" panose="020B0303030302020204" pitchFamily="34" charset="-127"/>
-                <a:ea typeface="에스코어 드림 3 Light" panose="020B0303030302020204" pitchFamily="34" charset="-127"/>
-              </a:rPr>
-              <a:t>깃발</a:t>
-            </a:r>
-            <a:endParaRPr lang="en-US" altLang="ko-KR" sz="2000" dirty="0">
-              <a:latin typeface="에스코어 드림 3 Light" panose="020B0303030302020204" pitchFamily="34" charset="-127"/>
-              <a:ea typeface="에스코어 드림 3 Light" panose="020B0303030302020204" pitchFamily="34" charset="-127"/>
-            </a:endParaRPr>
-          </a:p>
-        </p:txBody>
-      </p:sp>
-      <p:sp>
-        <p:nvSpPr>
-          <p:cNvPr id="31" name="TextBox 30">
-            <a:extLst>
-              <a:ext uri="{FF2B5EF4-FFF2-40B4-BE49-F238E27FC236}">
-                <a16:creationId xmlns:a16="http://schemas.microsoft.com/office/drawing/2014/main" id="{106205CD-7B6E-1BDA-87C5-4B3038EF80EA}"/>
-              </a:ext>
-            </a:extLst>
-          </p:cNvPr>
-          <p:cNvSpPr txBox="1"/>
-          <p:nvPr/>
-        </p:nvSpPr>
-        <p:spPr>
-          <a:xfrm>
-            <a:off x="6507758" y="4570984"/>
-            <a:ext cx="2448106" cy="369332"/>
-          </a:xfrm>
-          <a:prstGeom prst="rect">
-            <a:avLst/>
-          </a:prstGeom>
-          <a:noFill/>
-        </p:spPr>
-        <p:txBody>
-          <a:bodyPr wrap="none" rtlCol="0">
-            <a:spAutoFit/>
-          </a:bodyPr>
-          <a:lstStyle/>
-          <a:p>
-            <a:r>
-              <a:rPr lang="ko-KR" altLang="en-US" dirty="0">
-                <a:solidFill>
-                  <a:sysClr val="windowText" lastClr="000000"/>
-                </a:solidFill>
-                <a:latin typeface="에스코어 드림 3 Light" panose="020B0303030302020204" pitchFamily="34" charset="-127"/>
-                <a:ea typeface="에스코어 드림 3 Light" panose="020B0303030302020204" pitchFamily="34" charset="-127"/>
-              </a:rPr>
-              <a:t>획득 시 추가점수 획득</a:t>
-            </a:r>
-            <a:r>
-              <a:rPr lang="en-US" altLang="ko-KR" dirty="0">
-                <a:solidFill>
-                  <a:sysClr val="windowText" lastClr="000000"/>
-                </a:solidFill>
-                <a:latin typeface="에스코어 드림 3 Light" panose="020B0303030302020204" pitchFamily="34" charset="-127"/>
-                <a:ea typeface="에스코어 드림 3 Light" panose="020B0303030302020204" pitchFamily="34" charset="-127"/>
-              </a:rPr>
-              <a:t>.</a:t>
-            </a:r>
-          </a:p>
-        </p:txBody>
-      </p:sp>
-      <p:sp>
-        <p:nvSpPr>
-          <p:cNvPr id="35" name="타원 34">
-            <a:extLst>
-              <a:ext uri="{FF2B5EF4-FFF2-40B4-BE49-F238E27FC236}">
-                <a16:creationId xmlns:a16="http://schemas.microsoft.com/office/drawing/2014/main" id="{191B9C7B-31AD-7051-1369-23853723CBF5}"/>
-              </a:ext>
-            </a:extLst>
-          </p:cNvPr>
-          <p:cNvSpPr/>
-          <p:nvPr/>
-        </p:nvSpPr>
-        <p:spPr>
-          <a:xfrm>
-            <a:off x="897947" y="4412536"/>
-            <a:ext cx="180000" cy="180000"/>
-          </a:xfrm>
-          <a:prstGeom prst="ellipse">
-            <a:avLst/>
-          </a:prstGeom>
-          <a:solidFill>
-            <a:schemeClr val="bg1">
-              <a:lumMod val="75000"/>
-            </a:schemeClr>
-          </a:solidFill>
-          <a:ln>
-            <a:solidFill>
-              <a:schemeClr val="bg1">
-                <a:lumMod val="75000"/>
-              </a:schemeClr>
-            </a:solidFill>
-          </a:ln>
-        </p:spPr>
-        <p:style>
-          <a:lnRef idx="2">
-            <a:schemeClr val="accent1">
-              <a:shade val="15000"/>
-            </a:schemeClr>
-          </a:lnRef>
-          <a:fillRef idx="1">
-            <a:schemeClr val="accent1"/>
-          </a:fillRef>
-          <a:effectRef idx="0">
-            <a:schemeClr val="accent1"/>
-          </a:effectRef>
-          <a:fontRef idx="minor">
-            <a:schemeClr val="lt1"/>
-          </a:fontRef>
-        </p:style>
-        <p:txBody>
-          <a:bodyPr rtlCol="0" anchor="ctr"/>
-          <a:lstStyle/>
-          <a:p>
-            <a:pPr algn="ctr"/>
-            <a:endParaRPr lang="ko-KR" altLang="en-US"/>
-          </a:p>
-        </p:txBody>
-      </p:sp>
-      <p:sp>
-        <p:nvSpPr>
-          <p:cNvPr id="36" name="TextBox 35">
-            <a:extLst>
-              <a:ext uri="{FF2B5EF4-FFF2-40B4-BE49-F238E27FC236}">
-                <a16:creationId xmlns:a16="http://schemas.microsoft.com/office/drawing/2014/main" id="{AFCB1BC4-A9BC-6863-B62F-9806D0923CE1}"/>
-              </a:ext>
-            </a:extLst>
-          </p:cNvPr>
-          <p:cNvSpPr txBox="1"/>
-          <p:nvPr/>
-        </p:nvSpPr>
-        <p:spPr>
-          <a:xfrm>
-            <a:off x="1166500" y="4271703"/>
-            <a:ext cx="1454244" cy="461665"/>
-          </a:xfrm>
-          <a:prstGeom prst="rect">
-            <a:avLst/>
-          </a:prstGeom>
-          <a:noFill/>
-        </p:spPr>
-        <p:txBody>
-          <a:bodyPr wrap="none" rtlCol="0">
-            <a:spAutoFit/>
-          </a:bodyPr>
-          <a:lstStyle/>
-          <a:p>
-            <a:r>
-              <a:rPr lang="ko-KR" altLang="en-US" sz="2400" dirty="0">
-                <a:latin typeface="에스코어 드림 4 Regular" panose="020B0503030302020204" pitchFamily="34" charset="-127"/>
-                <a:ea typeface="에스코어 드림 4 Regular" panose="020B0503030302020204" pitchFamily="34" charset="-127"/>
-              </a:rPr>
-              <a:t>재미 요소</a:t>
-            </a:r>
-            <a:endParaRPr lang="en-US" altLang="ko-KR" sz="2400" dirty="0">
-              <a:latin typeface="에스코어 드림 4 Regular" panose="020B0503030302020204" pitchFamily="34" charset="-127"/>
-              <a:ea typeface="에스코어 드림 4 Regular" panose="020B0503030302020204" pitchFamily="34" charset="-127"/>
-            </a:endParaRPr>
-          </a:p>
-        </p:txBody>
-      </p:sp>
-      <p:sp>
-        <p:nvSpPr>
-          <p:cNvPr id="38" name="TextBox 37">
-            <a:extLst>
-              <a:ext uri="{FF2B5EF4-FFF2-40B4-BE49-F238E27FC236}">
-                <a16:creationId xmlns:a16="http://schemas.microsoft.com/office/drawing/2014/main" id="{7863E302-49B4-36ED-32EE-43FE7DD7DCD1}"/>
-              </a:ext>
-            </a:extLst>
-          </p:cNvPr>
-          <p:cNvSpPr txBox="1"/>
-          <p:nvPr/>
-        </p:nvSpPr>
-        <p:spPr>
-          <a:xfrm>
-            <a:off x="6286086" y="5052770"/>
-            <a:ext cx="1739579" cy="400110"/>
-          </a:xfrm>
-          <a:prstGeom prst="rect">
-            <a:avLst/>
-          </a:prstGeom>
-          <a:noFill/>
-        </p:spPr>
-        <p:txBody>
-          <a:bodyPr wrap="none" rtlCol="0">
-            <a:spAutoFit/>
-          </a:bodyPr>
-          <a:lstStyle/>
-          <a:p>
-            <a:r>
-              <a:rPr lang="ko-KR" altLang="en-US" sz="2000" dirty="0">
-                <a:latin typeface="에스코어 드림 3 Light" panose="020B0303030302020204" pitchFamily="34" charset="-127"/>
-                <a:ea typeface="에스코어 드림 3 Light" panose="020B0303030302020204" pitchFamily="34" charset="-127"/>
-              </a:rPr>
-              <a:t>플레이어 속도</a:t>
-            </a:r>
-            <a:endParaRPr lang="en-US" altLang="ko-KR" sz="2000" dirty="0">
-              <a:latin typeface="에스코어 드림 3 Light" panose="020B0303030302020204" pitchFamily="34" charset="-127"/>
-              <a:ea typeface="에스코어 드림 3 Light" panose="020B0303030302020204" pitchFamily="34" charset="-127"/>
-            </a:endParaRPr>
-          </a:p>
-        </p:txBody>
-      </p:sp>
-      <p:sp>
-        <p:nvSpPr>
-          <p:cNvPr id="39" name="TextBox 38">
-            <a:extLst>
-              <a:ext uri="{FF2B5EF4-FFF2-40B4-BE49-F238E27FC236}">
-                <a16:creationId xmlns:a16="http://schemas.microsoft.com/office/drawing/2014/main" id="{58619343-A1EC-D7E0-A43A-2649CBA9400D}"/>
-              </a:ext>
-            </a:extLst>
-          </p:cNvPr>
-          <p:cNvSpPr txBox="1"/>
-          <p:nvPr/>
-        </p:nvSpPr>
-        <p:spPr>
-          <a:xfrm>
-            <a:off x="6507758" y="5454156"/>
-            <a:ext cx="3842719" cy="369332"/>
-          </a:xfrm>
-          <a:prstGeom prst="rect">
-            <a:avLst/>
-          </a:prstGeom>
-          <a:noFill/>
-        </p:spPr>
-        <p:txBody>
-          <a:bodyPr wrap="none" rtlCol="0">
-            <a:spAutoFit/>
-          </a:bodyPr>
-          <a:lstStyle/>
-          <a:p>
-            <a:r>
-              <a:rPr lang="ko-KR" altLang="en-US" dirty="0">
-                <a:solidFill>
-                  <a:sysClr val="windowText" lastClr="000000"/>
-                </a:solidFill>
-                <a:latin typeface="에스코어 드림 3 Light" panose="020B0303030302020204" pitchFamily="34" charset="-127"/>
-                <a:ea typeface="에스코어 드림 3 Light" panose="020B0303030302020204" pitchFamily="34" charset="-127"/>
-              </a:rPr>
-              <a:t>시간이 지날수록 속도가 점점 </a:t>
-            </a:r>
-            <a:r>
-              <a:rPr lang="ko-KR" altLang="en-US" dirty="0" err="1">
-                <a:solidFill>
-                  <a:sysClr val="windowText" lastClr="000000"/>
-                </a:solidFill>
-                <a:latin typeface="에스코어 드림 3 Light" panose="020B0303030302020204" pitchFamily="34" charset="-127"/>
-                <a:ea typeface="에스코어 드림 3 Light" panose="020B0303030302020204" pitchFamily="34" charset="-127"/>
-              </a:rPr>
-              <a:t>빨라짐</a:t>
-            </a:r>
-            <a:r>
-              <a:rPr lang="en-US" altLang="ko-KR" dirty="0">
-                <a:solidFill>
-                  <a:sysClr val="windowText" lastClr="000000"/>
-                </a:solidFill>
-                <a:latin typeface="에스코어 드림 3 Light" panose="020B0303030302020204" pitchFamily="34" charset="-127"/>
-                <a:ea typeface="에스코어 드림 3 Light" panose="020B0303030302020204" pitchFamily="34" charset="-127"/>
-              </a:rPr>
-              <a:t>.</a:t>
-            </a:r>
-          </a:p>
-        </p:txBody>
-      </p:sp>
-      <p:sp>
-        <p:nvSpPr>
-          <p:cNvPr id="40" name="TextBox 39">
-            <a:extLst>
-              <a:ext uri="{FF2B5EF4-FFF2-40B4-BE49-F238E27FC236}">
-                <a16:creationId xmlns:a16="http://schemas.microsoft.com/office/drawing/2014/main" id="{9665B4CD-1302-6A5B-2079-9940A63773CD}"/>
-              </a:ext>
-            </a:extLst>
-          </p:cNvPr>
-          <p:cNvSpPr txBox="1"/>
-          <p:nvPr/>
-        </p:nvSpPr>
-        <p:spPr>
-          <a:xfrm>
-            <a:off x="1388172" y="4848518"/>
-            <a:ext cx="3906839" cy="369332"/>
-          </a:xfrm>
-          <a:prstGeom prst="rect">
-            <a:avLst/>
-          </a:prstGeom>
-          <a:noFill/>
-        </p:spPr>
-        <p:txBody>
-          <a:bodyPr wrap="none" rtlCol="0">
-            <a:spAutoFit/>
-          </a:bodyPr>
-          <a:lstStyle/>
-          <a:p>
-            <a:r>
-              <a:rPr lang="ko-KR" altLang="en-US" dirty="0">
-                <a:latin typeface="에스코어 드림 3 Light" panose="020B0303030302020204" pitchFamily="34" charset="-127"/>
-                <a:ea typeface="에스코어 드림 3 Light" panose="020B0303030302020204" pitchFamily="34" charset="-127"/>
-              </a:rPr>
-              <a:t>스키 속도가 </a:t>
-            </a:r>
-            <a:r>
-              <a:rPr lang="ko-KR" altLang="en-US" dirty="0" err="1">
-                <a:latin typeface="에스코어 드림 3 Light" panose="020B0303030302020204" pitchFamily="34" charset="-127"/>
-                <a:ea typeface="에스코어 드림 3 Light" panose="020B0303030302020204" pitchFamily="34" charset="-127"/>
-              </a:rPr>
-              <a:t>빨라짐에</a:t>
-            </a:r>
-            <a:r>
-              <a:rPr lang="ko-KR" altLang="en-US" dirty="0">
-                <a:latin typeface="에스코어 드림 3 Light" panose="020B0303030302020204" pitchFamily="34" charset="-127"/>
-                <a:ea typeface="에스코어 드림 3 Light" panose="020B0303030302020204" pitchFamily="34" charset="-127"/>
-              </a:rPr>
-              <a:t> 따라 몰입도 </a:t>
-            </a:r>
-            <a:r>
-              <a:rPr lang="ko-KR" altLang="en-US" dirty="0">
-                <a:solidFill>
-                  <a:srgbClr val="FF0000"/>
-                </a:solidFill>
-                <a:latin typeface="에스코어 드림 3 Light" panose="020B0303030302020204" pitchFamily="34" charset="-127"/>
-                <a:ea typeface="에스코어 드림 3 Light" panose="020B0303030302020204" pitchFamily="34" charset="-127"/>
-              </a:rPr>
-              <a:t>↑</a:t>
-            </a:r>
-            <a:r>
-              <a:rPr lang="ko-KR" altLang="en-US" dirty="0">
-                <a:latin typeface="에스코어 드림 3 Light" panose="020B0303030302020204" pitchFamily="34" charset="-127"/>
-                <a:ea typeface="에스코어 드림 3 Light" panose="020B0303030302020204" pitchFamily="34" charset="-127"/>
-              </a:rPr>
-              <a:t> </a:t>
-            </a:r>
-            <a:endParaRPr lang="en-US" altLang="ko-KR" dirty="0">
-              <a:latin typeface="에스코어 드림 3 Light" panose="020B0303030302020204" pitchFamily="34" charset="-127"/>
-              <a:ea typeface="에스코어 드림 3 Light" panose="020B0303030302020204" pitchFamily="34" charset="-127"/>
-            </a:endParaRPr>
-          </a:p>
-        </p:txBody>
-      </p:sp>
-      <p:sp>
-        <p:nvSpPr>
-          <p:cNvPr id="42" name="TextBox 41">
-            <a:extLst>
-              <a:ext uri="{FF2B5EF4-FFF2-40B4-BE49-F238E27FC236}">
-                <a16:creationId xmlns:a16="http://schemas.microsoft.com/office/drawing/2014/main" id="{E2C100E9-4E74-74E8-C863-13D2CF9439F4}"/>
-              </a:ext>
-            </a:extLst>
-          </p:cNvPr>
-          <p:cNvSpPr txBox="1"/>
-          <p:nvPr/>
-        </p:nvSpPr>
-        <p:spPr>
-          <a:xfrm>
-            <a:off x="1388172" y="5412582"/>
-            <a:ext cx="4281941" cy="369332"/>
-          </a:xfrm>
-          <a:prstGeom prst="rect">
-            <a:avLst/>
-          </a:prstGeom>
-          <a:noFill/>
-        </p:spPr>
-        <p:txBody>
-          <a:bodyPr wrap="none" rtlCol="0">
-            <a:spAutoFit/>
-          </a:bodyPr>
-          <a:lstStyle/>
-          <a:p>
-            <a:r>
-              <a:rPr lang="ko-KR" altLang="en-US" dirty="0">
-                <a:latin typeface="에스코어 드림 3 Light" panose="020B0303030302020204" pitchFamily="34" charset="-127"/>
-                <a:ea typeface="에스코어 드림 3 Light" panose="020B0303030302020204" pitchFamily="34" charset="-127"/>
-              </a:rPr>
-              <a:t>장애물의 도입으로 긴장감 및 스릴감 조성</a:t>
-            </a:r>
-            <a:endParaRPr lang="en-US" altLang="ko-KR" dirty="0">
-              <a:latin typeface="에스코어 드림 3 Light" panose="020B0303030302020204" pitchFamily="34" charset="-127"/>
-              <a:ea typeface="에스코어 드림 3 Light" panose="020B0303030302020204" pitchFamily="34" charset="-127"/>
-            </a:endParaRPr>
-          </a:p>
-        </p:txBody>
-      </p:sp>
-      <p:sp>
-        <p:nvSpPr>
-          <p:cNvPr id="9" name="TextBox 8">
-            <a:extLst>
-              <a:ext uri="{FF2B5EF4-FFF2-40B4-BE49-F238E27FC236}">
-                <a16:creationId xmlns:a16="http://schemas.microsoft.com/office/drawing/2014/main" id="{858019AD-DEDE-A302-261E-37A90E70165D}"/>
-              </a:ext>
-            </a:extLst>
-          </p:cNvPr>
-          <p:cNvSpPr txBox="1"/>
-          <p:nvPr/>
-        </p:nvSpPr>
-        <p:spPr>
-          <a:xfrm>
-            <a:off x="6286086" y="5945459"/>
-            <a:ext cx="678391" cy="400110"/>
-          </a:xfrm>
-          <a:prstGeom prst="rect">
-            <a:avLst/>
-          </a:prstGeom>
-          <a:noFill/>
-        </p:spPr>
-        <p:txBody>
-          <a:bodyPr wrap="none" rtlCol="0">
-            <a:spAutoFit/>
-          </a:bodyPr>
-          <a:lstStyle/>
-          <a:p>
-            <a:r>
-              <a:rPr lang="ko-KR" altLang="en-US" sz="2000" dirty="0">
-                <a:latin typeface="에스코어 드림 3 Light" panose="020B0303030302020204" pitchFamily="34" charset="-127"/>
-                <a:ea typeface="에스코어 드림 3 Light" panose="020B0303030302020204" pitchFamily="34" charset="-127"/>
-              </a:rPr>
-              <a:t>목숨</a:t>
-            </a:r>
-            <a:endParaRPr lang="en-US" altLang="ko-KR" sz="2000" dirty="0">
-              <a:latin typeface="에스코어 드림 3 Light" panose="020B0303030302020204" pitchFamily="34" charset="-127"/>
-              <a:ea typeface="에스코어 드림 3 Light" panose="020B0303030302020204" pitchFamily="34" charset="-127"/>
-            </a:endParaRPr>
-          </a:p>
-        </p:txBody>
-      </p:sp>
-      <p:sp>
-        <p:nvSpPr>
-          <p:cNvPr id="10" name="TextBox 9">
-            <a:extLst>
-              <a:ext uri="{FF2B5EF4-FFF2-40B4-BE49-F238E27FC236}">
-                <a16:creationId xmlns:a16="http://schemas.microsoft.com/office/drawing/2014/main" id="{17B04580-50CE-0FD9-44DF-152B13DD92E4}"/>
-              </a:ext>
-            </a:extLst>
-          </p:cNvPr>
-          <p:cNvSpPr txBox="1"/>
-          <p:nvPr/>
-        </p:nvSpPr>
-        <p:spPr>
-          <a:xfrm>
-            <a:off x="6507758" y="6335243"/>
-            <a:ext cx="5593198" cy="369332"/>
-          </a:xfrm>
-          <a:prstGeom prst="rect">
-            <a:avLst/>
-          </a:prstGeom>
-          <a:noFill/>
-        </p:spPr>
-        <p:txBody>
-          <a:bodyPr wrap="none" rtlCol="0">
-            <a:spAutoFit/>
-          </a:bodyPr>
-          <a:lstStyle/>
-          <a:p>
-            <a:r>
-              <a:rPr lang="ko-KR" altLang="en-US" dirty="0">
-                <a:solidFill>
-                  <a:sysClr val="windowText" lastClr="000000"/>
-                </a:solidFill>
-                <a:latin typeface="에스코어 드림 3 Light" panose="020B0303030302020204" pitchFamily="34" charset="-127"/>
-                <a:ea typeface="에스코어 드림 3 Light" panose="020B0303030302020204" pitchFamily="34" charset="-127"/>
-              </a:rPr>
-              <a:t>무한 모드에만 존재하고</a:t>
-            </a:r>
-            <a:r>
-              <a:rPr lang="en-US" altLang="ko-KR" dirty="0">
-                <a:solidFill>
-                  <a:sysClr val="windowText" lastClr="000000"/>
-                </a:solidFill>
-                <a:latin typeface="에스코어 드림 3 Light" panose="020B0303030302020204" pitchFamily="34" charset="-127"/>
-                <a:ea typeface="에스코어 드림 3 Light" panose="020B0303030302020204" pitchFamily="34" charset="-127"/>
-              </a:rPr>
-              <a:t>, </a:t>
-            </a:r>
-            <a:r>
-              <a:rPr lang="ko-KR" altLang="en-US" dirty="0">
-                <a:solidFill>
-                  <a:sysClr val="windowText" lastClr="000000"/>
-                </a:solidFill>
-                <a:latin typeface="에스코어 드림 3 Light" panose="020B0303030302020204" pitchFamily="34" charset="-127"/>
-                <a:ea typeface="에스코어 드림 3 Light" panose="020B0303030302020204" pitchFamily="34" charset="-127"/>
-              </a:rPr>
-              <a:t>장애물과 충돌 시 하나씩 감소</a:t>
-            </a:r>
-            <a:endParaRPr lang="en-US" altLang="ko-KR" dirty="0">
-              <a:solidFill>
-                <a:sysClr val="windowText" lastClr="000000"/>
-              </a:solidFill>
-              <a:latin typeface="에스코어 드림 3 Light" panose="020B0303030302020204" pitchFamily="34" charset="-127"/>
-              <a:ea typeface="에스코어 드림 3 Light" panose="020B0303030302020204" pitchFamily="34" charset="-127"/>
-            </a:endParaRPr>
-          </a:p>
-        </p:txBody>
-      </p:sp>
-    </p:spTree>
-    <p:extLst>
-      <p:ext uri="{BB962C8B-B14F-4D97-AF65-F5344CB8AC3E}">
-        <p14:creationId xmlns:p14="http://schemas.microsoft.com/office/powerpoint/2010/main" val="537939450"/>
-      </p:ext>
-    </p:extLst>
-  </p:cSld>
-  <p:clrMapOvr>
-    <a:masterClrMapping/>
-  </p:clrMapOvr>
-</p:sld>
-</file>
-
-<file path=ppt/slides/slide3.xml><?xml version="1.0" encoding="utf-8"?>
-<p:sld xmlns:a="http://schemas.openxmlformats.org/drawingml/2006/main" xmlns:r="http://schemas.openxmlformats.org/officeDocument/2006/relationships" xmlns:p="http://schemas.openxmlformats.org/presentationml/2006/main">
-  <p:cSld>
-    <p:spTree>
-      <p:nvGrpSpPr>
-        <p:cNvPr id="1" name=""/>
-        <p:cNvGrpSpPr/>
-        <p:nvPr/>
-      </p:nvGrpSpPr>
-      <p:grpSpPr>
-        <a:xfrm>
-          <a:off x="0" y="0"/>
-          <a:ext cx="0" cy="0"/>
-          <a:chOff x="0" y="0"/>
-          <a:chExt cx="0" cy="0"/>
-        </a:xfrm>
-      </p:grpSpPr>
-      <p:sp>
-        <p:nvSpPr>
-          <p:cNvPr id="2" name="TextBox 1">
-            <a:extLst>
-              <a:ext uri="{FF2B5EF4-FFF2-40B4-BE49-F238E27FC236}">
-                <a16:creationId xmlns:a16="http://schemas.microsoft.com/office/drawing/2014/main" id="{7CD5D18E-745A-761B-75E2-59C5E7BAE6A6}"/>
-              </a:ext>
-            </a:extLst>
-          </p:cNvPr>
-          <p:cNvSpPr txBox="1"/>
-          <p:nvPr/>
-        </p:nvSpPr>
-        <p:spPr>
-          <a:xfrm>
-            <a:off x="295565" y="193965"/>
-            <a:ext cx="3467616" cy="646331"/>
-          </a:xfrm>
-          <a:prstGeom prst="rect">
-            <a:avLst/>
-          </a:prstGeom>
-          <a:noFill/>
-        </p:spPr>
-        <p:txBody>
-          <a:bodyPr wrap="none" rtlCol="0">
-            <a:spAutoFit/>
-          </a:bodyPr>
-          <a:lstStyle/>
-          <a:p>
-            <a:r>
-              <a:rPr lang="ko-KR" altLang="en-US" sz="3600" dirty="0">
-                <a:latin typeface="에스코어 드림 8 Heavy" panose="020B0903030302020204" pitchFamily="34" charset="-127"/>
-                <a:ea typeface="에스코어 드림 8 Heavy" panose="020B0903030302020204" pitchFamily="34" charset="-127"/>
-              </a:rPr>
-              <a:t>개발 일정 </a:t>
-            </a:r>
-            <a:r>
-              <a:rPr lang="en-US" altLang="ko-KR" sz="3600" dirty="0">
-                <a:latin typeface="에스코어 드림 8 Heavy" panose="020B0903030302020204" pitchFamily="34" charset="-127"/>
-                <a:ea typeface="에스코어 드림 8 Heavy" panose="020B0903030302020204" pitchFamily="34" charset="-127"/>
-              </a:rPr>
-              <a:t>(</a:t>
-            </a:r>
-            <a:r>
-              <a:rPr lang="ko-KR" altLang="en-US" sz="3600" dirty="0">
-                <a:latin typeface="에스코어 드림 8 Heavy" panose="020B0903030302020204" pitchFamily="34" charset="-127"/>
-                <a:ea typeface="에스코어 드림 8 Heavy" panose="020B0903030302020204" pitchFamily="34" charset="-127"/>
-              </a:rPr>
-              <a:t>수정</a:t>
-            </a:r>
-            <a:r>
-              <a:rPr lang="en-US" altLang="ko-KR" sz="3600" dirty="0">
-                <a:latin typeface="에스코어 드림 8 Heavy" panose="020B0903030302020204" pitchFamily="34" charset="-127"/>
-                <a:ea typeface="에스코어 드림 8 Heavy" panose="020B0903030302020204" pitchFamily="34" charset="-127"/>
-              </a:rPr>
-              <a:t>)</a:t>
-            </a:r>
-          </a:p>
-        </p:txBody>
-      </p:sp>
-      <p:sp>
-        <p:nvSpPr>
-          <p:cNvPr id="3" name="직사각형 2">
-            <a:extLst>
-              <a:ext uri="{FF2B5EF4-FFF2-40B4-BE49-F238E27FC236}">
-                <a16:creationId xmlns:a16="http://schemas.microsoft.com/office/drawing/2014/main" id="{AFB45B25-61AE-1829-B42B-EC2A588C7108}"/>
-              </a:ext>
-            </a:extLst>
-          </p:cNvPr>
-          <p:cNvSpPr/>
-          <p:nvPr/>
-        </p:nvSpPr>
-        <p:spPr>
-          <a:xfrm>
-            <a:off x="-1" y="221673"/>
-            <a:ext cx="166255" cy="655782"/>
-          </a:xfrm>
-          <a:prstGeom prst="rect">
-            <a:avLst/>
-          </a:prstGeom>
-          <a:solidFill>
-            <a:srgbClr val="A3D0EB"/>
-          </a:solidFill>
-          <a:ln>
-            <a:solidFill>
-              <a:srgbClr val="A3D0EB"/>
-            </a:solidFill>
-          </a:ln>
-        </p:spPr>
-        <p:style>
-          <a:lnRef idx="2">
-            <a:schemeClr val="accent1">
-              <a:shade val="15000"/>
-            </a:schemeClr>
-          </a:lnRef>
-          <a:fillRef idx="1">
-            <a:schemeClr val="accent1"/>
-          </a:fillRef>
-          <a:effectRef idx="0">
-            <a:schemeClr val="accent1"/>
-          </a:effectRef>
-          <a:fontRef idx="minor">
-            <a:schemeClr val="lt1"/>
-          </a:fontRef>
-        </p:style>
-        <p:txBody>
-          <a:bodyPr rtlCol="0" anchor="ctr"/>
-          <a:lstStyle/>
-          <a:p>
-            <a:pPr algn="ctr"/>
-            <a:endParaRPr lang="ko-KR" altLang="en-US"/>
-          </a:p>
-        </p:txBody>
-      </p:sp>
-      <p:sp>
-        <p:nvSpPr>
-          <p:cNvPr id="4" name="TextBox 3">
-            <a:extLst>
-              <a:ext uri="{FF2B5EF4-FFF2-40B4-BE49-F238E27FC236}">
-                <a16:creationId xmlns:a16="http://schemas.microsoft.com/office/drawing/2014/main" id="{D6798DA1-6891-83A0-1BEE-264357304621}"/>
-              </a:ext>
-            </a:extLst>
-          </p:cNvPr>
-          <p:cNvSpPr txBox="1"/>
-          <p:nvPr/>
-        </p:nvSpPr>
-        <p:spPr>
-          <a:xfrm>
-            <a:off x="2193926" y="1029887"/>
-            <a:ext cx="7136890" cy="1107996"/>
-          </a:xfrm>
-          <a:prstGeom prst="rect">
-            <a:avLst/>
-          </a:prstGeom>
-          <a:noFill/>
-        </p:spPr>
-        <p:txBody>
-          <a:bodyPr wrap="none" rtlCol="0">
-            <a:spAutoFit/>
-          </a:bodyPr>
-          <a:lstStyle/>
-          <a:p>
-            <a:r>
-              <a:rPr lang="en-US" altLang="ko-KR" sz="3300" dirty="0">
-                <a:latin typeface="에스코어 드림 7 ExtraBold" panose="020B0803030302020204" pitchFamily="34" charset="-127"/>
-                <a:ea typeface="에스코어 드림 7 ExtraBold" panose="020B0803030302020204" pitchFamily="34" charset="-127"/>
-              </a:rPr>
-              <a:t>1</a:t>
-            </a:r>
-            <a:r>
-              <a:rPr lang="ko-KR" altLang="en-US" sz="3300" dirty="0">
-                <a:latin typeface="에스코어 드림 7 ExtraBold" panose="020B0803030302020204" pitchFamily="34" charset="-127"/>
-                <a:ea typeface="에스코어 드림 7 ExtraBold" panose="020B0803030302020204" pitchFamily="34" charset="-127"/>
-              </a:rPr>
-              <a:t>주차 </a:t>
-            </a:r>
-            <a:r>
-              <a:rPr lang="en-US" altLang="ko-KR" sz="3300" dirty="0">
-                <a:latin typeface="에스코어 드림 7 ExtraBold" panose="020B0803030302020204" pitchFamily="34" charset="-127"/>
-                <a:ea typeface="에스코어 드림 7 ExtraBold" panose="020B0803030302020204" pitchFamily="34" charset="-127"/>
-              </a:rPr>
-              <a:t>: </a:t>
-            </a:r>
-            <a:r>
-              <a:rPr lang="ko-KR" altLang="en-US" sz="3300" dirty="0">
-                <a:latin typeface="에스코어 드림 7 ExtraBold" panose="020B0803030302020204" pitchFamily="34" charset="-127"/>
-                <a:ea typeface="에스코어 드림 7 ExtraBold" panose="020B0803030302020204" pitchFamily="34" charset="-127"/>
-              </a:rPr>
-              <a:t>게임 제작 관련 리소스 수집 및</a:t>
-            </a:r>
-            <a:endParaRPr lang="en-US" altLang="ko-KR" sz="3300" dirty="0">
-              <a:latin typeface="에스코어 드림 7 ExtraBold" panose="020B0803030302020204" pitchFamily="34" charset="-127"/>
-              <a:ea typeface="에스코어 드림 7 ExtraBold" panose="020B0803030302020204" pitchFamily="34" charset="-127"/>
-            </a:endParaRPr>
-          </a:p>
-          <a:p>
-            <a:r>
-              <a:rPr lang="en-US" altLang="ko-KR" sz="3300" dirty="0">
-                <a:latin typeface="에스코어 드림 7 ExtraBold" panose="020B0803030302020204" pitchFamily="34" charset="-127"/>
-                <a:ea typeface="에스코어 드림 7 ExtraBold" panose="020B0803030302020204" pitchFamily="34" charset="-127"/>
-              </a:rPr>
-              <a:t>		</a:t>
-            </a:r>
-            <a:r>
-              <a:rPr lang="ko-KR" altLang="en-US" sz="3300" dirty="0">
-                <a:latin typeface="에스코어 드림 7 ExtraBold" panose="020B0803030302020204" pitchFamily="34" charset="-127"/>
-                <a:ea typeface="에스코어 드림 7 ExtraBold" panose="020B0803030302020204" pitchFamily="34" charset="-127"/>
-              </a:rPr>
-              <a:t>이미지 로드</a:t>
-            </a:r>
-            <a:endParaRPr lang="en-US" altLang="ko-KR" sz="3300" dirty="0">
-              <a:latin typeface="에스코어 드림 7 ExtraBold" panose="020B0803030302020204" pitchFamily="34" charset="-127"/>
-              <a:ea typeface="에스코어 드림 7 ExtraBold" panose="020B0803030302020204" pitchFamily="34" charset="-127"/>
-            </a:endParaRPr>
-          </a:p>
-        </p:txBody>
-      </p:sp>
-      <p:sp>
-        <p:nvSpPr>
-          <p:cNvPr id="5" name="TextBox 4">
-            <a:extLst>
-              <a:ext uri="{FF2B5EF4-FFF2-40B4-BE49-F238E27FC236}">
-                <a16:creationId xmlns:a16="http://schemas.microsoft.com/office/drawing/2014/main" id="{4421CD05-183E-0C7B-126A-073781938F4F}"/>
-              </a:ext>
-            </a:extLst>
-          </p:cNvPr>
-          <p:cNvSpPr txBox="1"/>
-          <p:nvPr/>
-        </p:nvSpPr>
-        <p:spPr>
-          <a:xfrm>
-            <a:off x="2193926" y="2278646"/>
-            <a:ext cx="6075702" cy="1107996"/>
-          </a:xfrm>
-          <a:prstGeom prst="rect">
-            <a:avLst/>
-          </a:prstGeom>
-          <a:noFill/>
-        </p:spPr>
-        <p:txBody>
-          <a:bodyPr wrap="none" rtlCol="0">
-            <a:spAutoFit/>
-          </a:bodyPr>
-          <a:lstStyle/>
-          <a:p>
-            <a:r>
-              <a:rPr lang="en-US" altLang="ko-KR" sz="3300" dirty="0">
-                <a:latin typeface="에스코어 드림 7 ExtraBold" panose="020B0803030302020204" pitchFamily="34" charset="-127"/>
-                <a:ea typeface="에스코어 드림 7 ExtraBold" panose="020B0803030302020204" pitchFamily="34" charset="-127"/>
-              </a:rPr>
-              <a:t>2</a:t>
-            </a:r>
-            <a:r>
-              <a:rPr lang="ko-KR" altLang="en-US" sz="3300" dirty="0">
-                <a:latin typeface="에스코어 드림 7 ExtraBold" panose="020B0803030302020204" pitchFamily="34" charset="-127"/>
-                <a:ea typeface="에스코어 드림 7 ExtraBold" panose="020B0803030302020204" pitchFamily="34" charset="-127"/>
-              </a:rPr>
-              <a:t>주차 </a:t>
-            </a:r>
-            <a:r>
-              <a:rPr lang="en-US" altLang="ko-KR" sz="3300" dirty="0">
-                <a:latin typeface="에스코어 드림 7 ExtraBold" panose="020B0803030302020204" pitchFamily="34" charset="-127"/>
-                <a:ea typeface="에스코어 드림 7 ExtraBold" panose="020B0803030302020204" pitchFamily="34" charset="-127"/>
-              </a:rPr>
-              <a:t>: </a:t>
-            </a:r>
-            <a:r>
-              <a:rPr lang="ko-KR" altLang="en-US" sz="3300" dirty="0">
-                <a:latin typeface="에스코어 드림 7 ExtraBold" panose="020B0803030302020204" pitchFamily="34" charset="-127"/>
-                <a:ea typeface="에스코어 드림 7 ExtraBold" panose="020B0803030302020204" pitchFamily="34" charset="-127"/>
-              </a:rPr>
-              <a:t>게임의 전반적인 틀 잡기</a:t>
-            </a:r>
-            <a:endParaRPr lang="en-US" altLang="ko-KR" sz="3300" dirty="0">
-              <a:latin typeface="에스코어 드림 7 ExtraBold" panose="020B0803030302020204" pitchFamily="34" charset="-127"/>
-              <a:ea typeface="에스코어 드림 7 ExtraBold" panose="020B0803030302020204" pitchFamily="34" charset="-127"/>
-            </a:endParaRPr>
-          </a:p>
-          <a:p>
-            <a:r>
-              <a:rPr lang="en-US" altLang="ko-KR" sz="3300" dirty="0">
-                <a:latin typeface="에스코어 드림 7 ExtraBold" panose="020B0803030302020204" pitchFamily="34" charset="-127"/>
-                <a:ea typeface="에스코어 드림 7 ExtraBold" panose="020B0803030302020204" pitchFamily="34" charset="-127"/>
-              </a:rPr>
-              <a:t>	    (</a:t>
-            </a:r>
-            <a:r>
-              <a:rPr lang="ko-KR" altLang="en-US" sz="3300" dirty="0">
-                <a:latin typeface="에스코어 드림 7 ExtraBold" panose="020B0803030302020204" pitchFamily="34" charset="-127"/>
-                <a:ea typeface="에스코어 드림 7 ExtraBold" panose="020B0803030302020204" pitchFamily="34" charset="-127"/>
-              </a:rPr>
-              <a:t>추상화 및 클래스 생성</a:t>
-            </a:r>
-            <a:r>
-              <a:rPr lang="en-US" altLang="ko-KR" sz="3300" dirty="0">
-                <a:latin typeface="에스코어 드림 7 ExtraBold" panose="020B0803030302020204" pitchFamily="34" charset="-127"/>
-                <a:ea typeface="에스코어 드림 7 ExtraBold" panose="020B0803030302020204" pitchFamily="34" charset="-127"/>
-              </a:rPr>
-              <a:t>)</a:t>
-            </a:r>
-          </a:p>
-        </p:txBody>
-      </p:sp>
-      <p:sp>
-        <p:nvSpPr>
-          <p:cNvPr id="8" name="TextBox 7">
-            <a:extLst>
-              <a:ext uri="{FF2B5EF4-FFF2-40B4-BE49-F238E27FC236}">
-                <a16:creationId xmlns:a16="http://schemas.microsoft.com/office/drawing/2014/main" id="{095DA470-E9B3-21A7-2650-3DB2451AC9D1}"/>
-              </a:ext>
-            </a:extLst>
-          </p:cNvPr>
-          <p:cNvSpPr txBox="1"/>
-          <p:nvPr/>
-        </p:nvSpPr>
-        <p:spPr>
-          <a:xfrm>
-            <a:off x="2193926" y="3659833"/>
-            <a:ext cx="7136890" cy="600164"/>
-          </a:xfrm>
-          <a:prstGeom prst="rect">
-            <a:avLst/>
-          </a:prstGeom>
-          <a:noFill/>
-        </p:spPr>
-        <p:txBody>
-          <a:bodyPr wrap="none" rtlCol="0">
-            <a:spAutoFit/>
-          </a:bodyPr>
-          <a:lstStyle/>
-          <a:p>
-            <a:r>
-              <a:rPr lang="en-US" altLang="ko-KR" sz="3300" dirty="0">
-                <a:latin typeface="에스코어 드림 7 ExtraBold" panose="020B0803030302020204" pitchFamily="34" charset="-127"/>
-                <a:ea typeface="에스코어 드림 7 ExtraBold" panose="020B0803030302020204" pitchFamily="34" charset="-127"/>
-              </a:rPr>
-              <a:t>3</a:t>
-            </a:r>
-            <a:r>
-              <a:rPr lang="ko-KR" altLang="en-US" sz="3300" dirty="0">
-                <a:latin typeface="에스코어 드림 7 ExtraBold" panose="020B0803030302020204" pitchFamily="34" charset="-127"/>
-                <a:ea typeface="에스코어 드림 7 ExtraBold" panose="020B0803030302020204" pitchFamily="34" charset="-127"/>
-              </a:rPr>
-              <a:t>주차 </a:t>
-            </a:r>
-            <a:r>
-              <a:rPr lang="en-US" altLang="ko-KR" sz="3300" dirty="0">
-                <a:latin typeface="에스코어 드림 7 ExtraBold" panose="020B0803030302020204" pitchFamily="34" charset="-127"/>
-                <a:ea typeface="에스코어 드림 7 ExtraBold" panose="020B0803030302020204" pitchFamily="34" charset="-127"/>
-              </a:rPr>
-              <a:t>: </a:t>
-            </a:r>
-            <a:r>
-              <a:rPr lang="ko-KR" altLang="en-US" sz="3300" dirty="0">
-                <a:solidFill>
-                  <a:srgbClr val="FF0000"/>
-                </a:solidFill>
-                <a:latin typeface="에스코어 드림 7 ExtraBold" panose="020B0803030302020204" pitchFamily="34" charset="-127"/>
-                <a:ea typeface="에스코어 드림 7 ExtraBold" panose="020B0803030302020204" pitchFamily="34" charset="-127"/>
-              </a:rPr>
-              <a:t>로비 화면 </a:t>
-            </a:r>
-            <a:r>
-              <a:rPr lang="ko-KR" altLang="en-US" sz="3300" dirty="0">
-                <a:latin typeface="에스코어 드림 7 ExtraBold" panose="020B0803030302020204" pitchFamily="34" charset="-127"/>
-                <a:ea typeface="에스코어 드림 7 ExtraBold" panose="020B0803030302020204" pitchFamily="34" charset="-127"/>
-              </a:rPr>
-              <a:t>및 장애물 </a:t>
-            </a:r>
-            <a:r>
-              <a:rPr lang="ko-KR" altLang="en-US" sz="3300" dirty="0">
-                <a:solidFill>
-                  <a:srgbClr val="FF0000"/>
-                </a:solidFill>
-                <a:latin typeface="에스코어 드림 7 ExtraBold" panose="020B0803030302020204" pitchFamily="34" charset="-127"/>
-                <a:ea typeface="에스코어 드림 7 ExtraBold" panose="020B0803030302020204" pitchFamily="34" charset="-127"/>
-              </a:rPr>
-              <a:t>일부</a:t>
-            </a:r>
-            <a:r>
-              <a:rPr lang="ko-KR" altLang="en-US" sz="3300" dirty="0">
-                <a:latin typeface="에스코어 드림 7 ExtraBold" panose="020B0803030302020204" pitchFamily="34" charset="-127"/>
-                <a:ea typeface="에스코어 드림 7 ExtraBold" panose="020B0803030302020204" pitchFamily="34" charset="-127"/>
-              </a:rPr>
-              <a:t> 구현</a:t>
-            </a:r>
-            <a:endParaRPr lang="en-US" altLang="ko-KR" sz="3300" dirty="0">
-              <a:latin typeface="에스코어 드림 7 ExtraBold" panose="020B0803030302020204" pitchFamily="34" charset="-127"/>
-              <a:ea typeface="에스코어 드림 7 ExtraBold" panose="020B0803030302020204" pitchFamily="34" charset="-127"/>
-            </a:endParaRPr>
-          </a:p>
-        </p:txBody>
-      </p:sp>
-      <p:sp>
-        <p:nvSpPr>
-          <p:cNvPr id="10" name="TextBox 9">
-            <a:extLst>
-              <a:ext uri="{FF2B5EF4-FFF2-40B4-BE49-F238E27FC236}">
-                <a16:creationId xmlns:a16="http://schemas.microsoft.com/office/drawing/2014/main" id="{C1DCCA99-AB91-3823-AB9C-4D6580F57C45}"/>
-              </a:ext>
-            </a:extLst>
-          </p:cNvPr>
-          <p:cNvSpPr txBox="1"/>
-          <p:nvPr/>
-        </p:nvSpPr>
-        <p:spPr>
-          <a:xfrm>
-            <a:off x="2101562" y="4533188"/>
-            <a:ext cx="7358105" cy="1107996"/>
-          </a:xfrm>
-          <a:prstGeom prst="rect">
-            <a:avLst/>
-          </a:prstGeom>
-          <a:noFill/>
-        </p:spPr>
-        <p:txBody>
-          <a:bodyPr wrap="none" rtlCol="0">
-            <a:spAutoFit/>
-          </a:bodyPr>
-          <a:lstStyle/>
-          <a:p>
-            <a:r>
-              <a:rPr lang="en-US" altLang="ko-KR" sz="3300" dirty="0">
-                <a:solidFill>
-                  <a:srgbClr val="FF0000"/>
-                </a:solidFill>
-                <a:latin typeface="에스코어 드림 7 ExtraBold" panose="020B0803030302020204" pitchFamily="34" charset="-127"/>
-                <a:ea typeface="에스코어 드림 7 ExtraBold" panose="020B0803030302020204" pitchFamily="34" charset="-127"/>
-              </a:rPr>
-              <a:t>4</a:t>
-            </a:r>
-            <a:r>
-              <a:rPr lang="en-US" altLang="ko-KR" sz="3300" dirty="0">
-                <a:latin typeface="에스코어 드림 7 ExtraBold" panose="020B0803030302020204" pitchFamily="34" charset="-127"/>
-                <a:ea typeface="에스코어 드림 7 ExtraBold" panose="020B0803030302020204" pitchFamily="34" charset="-127"/>
-              </a:rPr>
-              <a:t>~7</a:t>
-            </a:r>
-            <a:r>
-              <a:rPr lang="ko-KR" altLang="en-US" sz="3300" dirty="0">
-                <a:latin typeface="에스코어 드림 7 ExtraBold" panose="020B0803030302020204" pitchFamily="34" charset="-127"/>
-                <a:ea typeface="에스코어 드림 7 ExtraBold" panose="020B0803030302020204" pitchFamily="34" charset="-127"/>
-              </a:rPr>
-              <a:t>주차 </a:t>
-            </a:r>
-            <a:r>
-              <a:rPr lang="en-US" altLang="ko-KR" sz="3300" dirty="0">
-                <a:latin typeface="에스코어 드림 7 ExtraBold" panose="020B0803030302020204" pitchFamily="34" charset="-127"/>
-                <a:ea typeface="에스코어 드림 7 ExtraBold" panose="020B0803030302020204" pitchFamily="34" charset="-127"/>
-              </a:rPr>
-              <a:t>: </a:t>
-            </a:r>
-            <a:r>
-              <a:rPr lang="ko-KR" altLang="en-US" sz="3300" dirty="0">
-                <a:latin typeface="에스코어 드림 7 ExtraBold" panose="020B0803030302020204" pitchFamily="34" charset="-127"/>
-                <a:ea typeface="에스코어 드림 7 ExtraBold" panose="020B0803030302020204" pitchFamily="34" charset="-127"/>
-              </a:rPr>
-              <a:t>캐릭터 컨트롤러 구현  및</a:t>
-            </a:r>
-            <a:endParaRPr lang="en-US" altLang="ko-KR" sz="3300" dirty="0">
-              <a:latin typeface="에스코어 드림 7 ExtraBold" panose="020B0803030302020204" pitchFamily="34" charset="-127"/>
-              <a:ea typeface="에스코어 드림 7 ExtraBold" panose="020B0803030302020204" pitchFamily="34" charset="-127"/>
-            </a:endParaRPr>
-          </a:p>
-          <a:p>
-            <a:r>
-              <a:rPr lang="en-US" altLang="ko-KR" sz="3300" dirty="0">
-                <a:latin typeface="에스코어 드림 7 ExtraBold" panose="020B0803030302020204" pitchFamily="34" charset="-127"/>
-                <a:ea typeface="에스코어 드림 7 ExtraBold" panose="020B0803030302020204" pitchFamily="34" charset="-127"/>
-              </a:rPr>
-              <a:t>			</a:t>
-            </a:r>
-            <a:r>
-              <a:rPr lang="ko-KR" altLang="en-US" sz="3300" dirty="0">
-                <a:latin typeface="에스코어 드림 7 ExtraBold" panose="020B0803030302020204" pitchFamily="34" charset="-127"/>
-                <a:ea typeface="에스코어 드림 7 ExtraBold" panose="020B0803030302020204" pitchFamily="34" charset="-127"/>
-              </a:rPr>
-              <a:t>충돌 처리 </a:t>
-            </a:r>
-            <a:r>
-              <a:rPr lang="en-US" altLang="ko-KR" sz="3300" dirty="0">
-                <a:solidFill>
-                  <a:srgbClr val="FF0000"/>
-                </a:solidFill>
-                <a:latin typeface="에스코어 드림 7 ExtraBold" panose="020B0803030302020204" pitchFamily="34" charset="-127"/>
-                <a:ea typeface="에스코어 드림 7 ExtraBold" panose="020B0803030302020204" pitchFamily="34" charset="-127"/>
-              </a:rPr>
-              <a:t>+ </a:t>
-            </a:r>
-            <a:r>
-              <a:rPr lang="ko-KR" altLang="en-US" sz="3300" dirty="0">
-                <a:solidFill>
-                  <a:srgbClr val="FF0000"/>
-                </a:solidFill>
-                <a:latin typeface="에스코어 드림 7 ExtraBold" panose="020B0803030302020204" pitchFamily="34" charset="-127"/>
-                <a:ea typeface="에스코어 드림 7 ExtraBold" panose="020B0803030302020204" pitchFamily="34" charset="-127"/>
-              </a:rPr>
-              <a:t>장애물 구현</a:t>
-            </a:r>
-            <a:endParaRPr lang="en-US" altLang="ko-KR" sz="3300" dirty="0">
-              <a:solidFill>
-                <a:srgbClr val="FF0000"/>
-              </a:solidFill>
-              <a:latin typeface="에스코어 드림 7 ExtraBold" panose="020B0803030302020204" pitchFamily="34" charset="-127"/>
-              <a:ea typeface="에스코어 드림 7 ExtraBold" panose="020B0803030302020204" pitchFamily="34" charset="-127"/>
-            </a:endParaRPr>
-          </a:p>
-        </p:txBody>
-      </p:sp>
-      <p:sp>
-        <p:nvSpPr>
-          <p:cNvPr id="15" name="TextBox 14">
-            <a:extLst>
-              <a:ext uri="{FF2B5EF4-FFF2-40B4-BE49-F238E27FC236}">
-                <a16:creationId xmlns:a16="http://schemas.microsoft.com/office/drawing/2014/main" id="{265392A2-4E98-D0AA-EB1A-993FABC12B75}"/>
-              </a:ext>
-            </a:extLst>
-          </p:cNvPr>
-          <p:cNvSpPr txBox="1"/>
-          <p:nvPr/>
-        </p:nvSpPr>
-        <p:spPr>
-          <a:xfrm>
-            <a:off x="2193926" y="5828113"/>
-            <a:ext cx="6311343" cy="600164"/>
-          </a:xfrm>
-          <a:prstGeom prst="rect">
-            <a:avLst/>
-          </a:prstGeom>
-          <a:noFill/>
-        </p:spPr>
-        <p:txBody>
-          <a:bodyPr wrap="none" rtlCol="0">
-            <a:spAutoFit/>
-          </a:bodyPr>
-          <a:lstStyle/>
-          <a:p>
-            <a:r>
-              <a:rPr lang="en-US" altLang="ko-KR" sz="3300" dirty="0">
-                <a:latin typeface="에스코어 드림 7 ExtraBold" panose="020B0803030302020204" pitchFamily="34" charset="-127"/>
-                <a:ea typeface="에스코어 드림 7 ExtraBold" panose="020B0803030302020204" pitchFamily="34" charset="-127"/>
-              </a:rPr>
-              <a:t>7~8</a:t>
-            </a:r>
-            <a:r>
-              <a:rPr lang="ko-KR" altLang="en-US" sz="3300" dirty="0">
-                <a:latin typeface="에스코어 드림 7 ExtraBold" panose="020B0803030302020204" pitchFamily="34" charset="-127"/>
-                <a:ea typeface="에스코어 드림 7 ExtraBold" panose="020B0803030302020204" pitchFamily="34" charset="-127"/>
-              </a:rPr>
-              <a:t>주차 </a:t>
-            </a:r>
-            <a:r>
-              <a:rPr lang="en-US" altLang="ko-KR" sz="3300" dirty="0">
-                <a:latin typeface="에스코어 드림 7 ExtraBold" panose="020B0803030302020204" pitchFamily="34" charset="-127"/>
-                <a:ea typeface="에스코어 드림 7 ExtraBold" panose="020B0803030302020204" pitchFamily="34" charset="-127"/>
-              </a:rPr>
-              <a:t>: </a:t>
-            </a:r>
-            <a:r>
-              <a:rPr lang="ko-KR" altLang="en-US" sz="3300" dirty="0">
-                <a:latin typeface="에스코어 드림 7 ExtraBold" panose="020B0803030302020204" pitchFamily="34" charset="-127"/>
-                <a:ea typeface="에스코어 드림 7 ExtraBold" panose="020B0803030302020204" pitchFamily="34" charset="-127"/>
-              </a:rPr>
-              <a:t>오류 수정 및 코드 정리</a:t>
-            </a:r>
-            <a:endParaRPr lang="en-US" altLang="ko-KR" sz="3300" dirty="0">
-              <a:latin typeface="에스코어 드림 7 ExtraBold" panose="020B0803030302020204" pitchFamily="34" charset="-127"/>
-              <a:ea typeface="에스코어 드림 7 ExtraBold" panose="020B0803030302020204" pitchFamily="34" charset="-127"/>
-            </a:endParaRPr>
-          </a:p>
-        </p:txBody>
-      </p:sp>
-    </p:spTree>
-    <p:extLst>
-      <p:ext uri="{BB962C8B-B14F-4D97-AF65-F5344CB8AC3E}">
-        <p14:creationId xmlns:p14="http://schemas.microsoft.com/office/powerpoint/2010/main" val="3639812719"/>
-      </p:ext>
-    </p:extLst>
-  </p:cSld>
-  <p:clrMapOvr>
-    <a:masterClrMapping/>
-  </p:clrMapOvr>
-</p:sld>
-</file>
-
-<file path=ppt/slides/slide4.xml><?xml version="1.0" encoding="utf-8"?>
-<p:sld xmlns:a="http://schemas.openxmlformats.org/drawingml/2006/main" xmlns:r="http://schemas.openxmlformats.org/officeDocument/2006/relationships" xmlns:p="http://schemas.openxmlformats.org/presentationml/2006/main">
-  <p:cSld>
-    <p:spTree>
-      <p:nvGrpSpPr>
-        <p:cNvPr id="1" name=""/>
-        <p:cNvGrpSpPr/>
-        <p:nvPr/>
-      </p:nvGrpSpPr>
-      <p:grpSpPr>
-        <a:xfrm>
-          <a:off x="0" y="0"/>
-          <a:ext cx="0" cy="0"/>
-          <a:chOff x="0" y="0"/>
-          <a:chExt cx="0" cy="0"/>
-        </a:xfrm>
-      </p:grpSpPr>
-      <p:sp>
-        <p:nvSpPr>
-          <p:cNvPr id="2" name="TextBox 1">
-            <a:extLst>
-              <a:ext uri="{FF2B5EF4-FFF2-40B4-BE49-F238E27FC236}">
-                <a16:creationId xmlns:a16="http://schemas.microsoft.com/office/drawing/2014/main" id="{7CD5D18E-745A-761B-75E2-59C5E7BAE6A6}"/>
-              </a:ext>
-            </a:extLst>
-          </p:cNvPr>
-          <p:cNvSpPr txBox="1"/>
-          <p:nvPr/>
-        </p:nvSpPr>
-        <p:spPr>
-          <a:xfrm>
-            <a:off x="295565" y="193965"/>
-            <a:ext cx="5017720" cy="646331"/>
-          </a:xfrm>
-          <a:prstGeom prst="rect">
-            <a:avLst/>
-          </a:prstGeom>
-          <a:noFill/>
-        </p:spPr>
-        <p:txBody>
-          <a:bodyPr wrap="none" rtlCol="0">
-            <a:spAutoFit/>
-          </a:bodyPr>
-          <a:lstStyle/>
-          <a:p>
-            <a:r>
-              <a:rPr lang="ko-KR" altLang="en-US" sz="3600" dirty="0">
-                <a:latin typeface="에스코어 드림 8 Heavy" panose="020B0903030302020204" pitchFamily="34" charset="-127"/>
-                <a:ea typeface="에스코어 드림 8 Heavy" panose="020B0903030302020204" pitchFamily="34" charset="-127"/>
-              </a:rPr>
-              <a:t>프로젝트 개발 진행 상황</a:t>
-            </a:r>
-            <a:endParaRPr lang="en-US" altLang="ko-KR" sz="3600" dirty="0">
-              <a:latin typeface="에스코어 드림 8 Heavy" panose="020B0903030302020204" pitchFamily="34" charset="-127"/>
-              <a:ea typeface="에스코어 드림 8 Heavy" panose="020B0903030302020204" pitchFamily="34" charset="-127"/>
-            </a:endParaRPr>
-          </a:p>
-        </p:txBody>
-      </p:sp>
-      <p:sp>
-        <p:nvSpPr>
-          <p:cNvPr id="3" name="직사각형 2">
-            <a:extLst>
-              <a:ext uri="{FF2B5EF4-FFF2-40B4-BE49-F238E27FC236}">
-                <a16:creationId xmlns:a16="http://schemas.microsoft.com/office/drawing/2014/main" id="{AFB45B25-61AE-1829-B42B-EC2A588C7108}"/>
-              </a:ext>
-            </a:extLst>
-          </p:cNvPr>
-          <p:cNvSpPr/>
-          <p:nvPr/>
-        </p:nvSpPr>
-        <p:spPr>
-          <a:xfrm>
-            <a:off x="-1" y="221673"/>
-            <a:ext cx="166255" cy="655782"/>
-          </a:xfrm>
-          <a:prstGeom prst="rect">
-            <a:avLst/>
-          </a:prstGeom>
-          <a:solidFill>
-            <a:srgbClr val="A3D0EB"/>
-          </a:solidFill>
-          <a:ln>
-            <a:solidFill>
-              <a:srgbClr val="A3D0EB"/>
-            </a:solidFill>
-          </a:ln>
-        </p:spPr>
-        <p:style>
-          <a:lnRef idx="2">
-            <a:schemeClr val="accent1">
-              <a:shade val="15000"/>
-            </a:schemeClr>
-          </a:lnRef>
-          <a:fillRef idx="1">
-            <a:schemeClr val="accent1"/>
-          </a:fillRef>
-          <a:effectRef idx="0">
-            <a:schemeClr val="accent1"/>
-          </a:effectRef>
-          <a:fontRef idx="minor">
-            <a:schemeClr val="lt1"/>
-          </a:fontRef>
-        </p:style>
-        <p:txBody>
-          <a:bodyPr rtlCol="0" anchor="ctr"/>
-          <a:lstStyle/>
-          <a:p>
-            <a:pPr algn="ctr"/>
-            <a:endParaRPr lang="ko-KR" altLang="en-US"/>
-          </a:p>
-        </p:txBody>
-      </p:sp>
       <p:graphicFrame>
         <p:nvGraphicFramePr>
           <p:cNvPr id="6" name="표 5">
@@ -5787,7 +3753,7 @@
           <p:nvPr>
             <p:extLst>
               <p:ext uri="{D42A27DB-BD31-4B8C-83A1-F6EECF244321}">
-                <p14:modId xmlns:p14="http://schemas.microsoft.com/office/powerpoint/2010/main" val="33451917"/>
+                <p14:modId xmlns:p14="http://schemas.microsoft.com/office/powerpoint/2010/main" val="990144224"/>
               </p:ext>
             </p:extLst>
           </p:nvPr>
@@ -6405,10 +4371,76 @@
                     <a:lstStyle/>
                     <a:p>
                       <a:pPr algn="ctr" latinLnBrk="1"/>
-                      <a:endParaRPr lang="ko-KR" altLang="en-US" sz="1500" dirty="0">
-                        <a:latin typeface="에스코어 드림 3 Light" panose="020B0303030302020204" pitchFamily="34" charset="-127"/>
-                        <a:ea typeface="에스코어 드림 3 Light" panose="020B0303030302020204" pitchFamily="34" charset="-127"/>
-                      </a:endParaRPr>
+                      <a:r>
+                        <a:rPr lang="ko-KR" altLang="en-US" sz="1400" dirty="0">
+                          <a:latin typeface="에스코어 드림 3 Light" panose="020B0303030302020204" pitchFamily="34" charset="-127"/>
+                          <a:ea typeface="에스코어 드림 3 Light" panose="020B0303030302020204" pitchFamily="34" charset="-127"/>
+                        </a:rPr>
+                        <a:t>로비 화면 </a:t>
+                      </a:r>
+                      <a:r>
+                        <a:rPr lang="en-US" altLang="ko-KR" sz="1400" dirty="0">
+                          <a:latin typeface="에스코어 드림 3 Light" panose="020B0303030302020204" pitchFamily="34" charset="-127"/>
+                          <a:ea typeface="에스코어 드림 3 Light" panose="020B0303030302020204" pitchFamily="34" charset="-127"/>
+                        </a:rPr>
+                        <a:t>(</a:t>
+                      </a:r>
+                      <a:r>
+                        <a:rPr lang="ko-KR" altLang="en-US" sz="1400" dirty="0">
+                          <a:latin typeface="에스코어 드림 3 Light" panose="020B0303030302020204" pitchFamily="34" charset="-127"/>
+                          <a:ea typeface="에스코어 드림 3 Light" panose="020B0303030302020204" pitchFamily="34" charset="-127"/>
+                        </a:rPr>
+                        <a:t>게임 제목 제외 완료</a:t>
+                      </a:r>
+                      <a:r>
+                        <a:rPr lang="en-US" altLang="ko-KR" sz="1400" dirty="0">
+                          <a:latin typeface="에스코어 드림 3 Light" panose="020B0303030302020204" pitchFamily="34" charset="-127"/>
+                          <a:ea typeface="에스코어 드림 3 Light" panose="020B0303030302020204" pitchFamily="34" charset="-127"/>
+                        </a:rPr>
+                        <a:t>), </a:t>
+                      </a:r>
+                      <a:r>
+                        <a:rPr lang="ko-KR" altLang="en-US" sz="1400" dirty="0">
+                          <a:latin typeface="에스코어 드림 3 Light" panose="020B0303030302020204" pitchFamily="34" charset="-127"/>
+                          <a:ea typeface="에스코어 드림 3 Light" panose="020B0303030302020204" pitchFamily="34" charset="-127"/>
+                        </a:rPr>
+                        <a:t>장애물</a:t>
+                      </a:r>
+                      <a:r>
+                        <a:rPr lang="en-US" altLang="ko-KR" sz="1400" dirty="0">
+                          <a:latin typeface="에스코어 드림 3 Light" panose="020B0303030302020204" pitchFamily="34" charset="-127"/>
+                          <a:ea typeface="에스코어 드림 3 Light" panose="020B0303030302020204" pitchFamily="34" charset="-127"/>
+                        </a:rPr>
+                        <a:t> </a:t>
+                      </a:r>
+                      <a:r>
+                        <a:rPr lang="ko-KR" altLang="en-US" sz="1400" dirty="0">
+                          <a:latin typeface="에스코어 드림 3 Light" panose="020B0303030302020204" pitchFamily="34" charset="-127"/>
+                          <a:ea typeface="에스코어 드림 3 Light" panose="020B0303030302020204" pitchFamily="34" charset="-127"/>
+                        </a:rPr>
+                        <a:t>중</a:t>
+                      </a:r>
+                      <a:r>
+                        <a:rPr lang="en-US" altLang="ko-KR" sz="1400" dirty="0">
+                          <a:latin typeface="에스코어 드림 3 Light" panose="020B0303030302020204" pitchFamily="34" charset="-127"/>
+                          <a:ea typeface="에스코어 드림 3 Light" panose="020B0303030302020204" pitchFamily="34" charset="-127"/>
+                        </a:rPr>
+                        <a:t> </a:t>
+                      </a:r>
+                      <a:r>
+                        <a:rPr lang="ko-KR" altLang="en-US" sz="1400" dirty="0">
+                          <a:latin typeface="에스코어 드림 3 Light" panose="020B0303030302020204" pitchFamily="34" charset="-127"/>
+                          <a:ea typeface="에스코어 드림 3 Light" panose="020B0303030302020204" pitchFamily="34" charset="-127"/>
+                        </a:rPr>
+                        <a:t>나무만 출력되는 오류</a:t>
+                      </a:r>
+                      <a:r>
+                        <a:rPr lang="ko-KR" altLang="en-US" sz="1500" dirty="0">
+                          <a:latin typeface="에스코어 드림 3 Light" panose="020B0303030302020204" pitchFamily="34" charset="-127"/>
+                          <a:ea typeface="에스코어 드림 3 Light" panose="020B0303030302020204" pitchFamily="34" charset="-127"/>
+                        </a:rPr>
+                        <a:t> </a:t>
+                      </a:r>
                     </a:p>
                   </a:txBody>
                   <a:tcPr/>
@@ -6584,10 +4616,69 @@
                     <a:lstStyle/>
                     <a:p>
                       <a:pPr algn="ctr" latinLnBrk="1"/>
-                      <a:endParaRPr lang="ko-KR" altLang="en-US" sz="1500" dirty="0">
-                        <a:latin typeface="에스코어 드림 3 Light" panose="020B0303030302020204" pitchFamily="34" charset="-127"/>
-                        <a:ea typeface="에스코어 드림 3 Light" panose="020B0303030302020204" pitchFamily="34" charset="-127"/>
-                      </a:endParaRPr>
+                      <a:r>
+                        <a:rPr lang="ko-KR" altLang="en-US" sz="1500" dirty="0">
+                          <a:latin typeface="에스코어 드림 3 Light" panose="020B0303030302020204" pitchFamily="34" charset="-127"/>
+                          <a:ea typeface="에스코어 드림 3 Light" panose="020B0303030302020204" pitchFamily="34" charset="-127"/>
+                        </a:rPr>
+                        <a:t>장애물</a:t>
+                      </a:r>
+                      <a:r>
+                        <a:rPr lang="en-US" altLang="ko-KR" sz="1500" dirty="0">
+                          <a:latin typeface="에스코어 드림 3 Light" panose="020B0303030302020204" pitchFamily="34" charset="-127"/>
+                          <a:ea typeface="에스코어 드림 3 Light" panose="020B0303030302020204" pitchFamily="34" charset="-127"/>
+                        </a:rPr>
+                        <a:t>(</a:t>
+                      </a:r>
+                      <a:r>
+                        <a:rPr lang="ko-KR" altLang="en-US" sz="1500" dirty="0">
+                          <a:latin typeface="에스코어 드림 3 Light" panose="020B0303030302020204" pitchFamily="34" charset="-127"/>
+                          <a:ea typeface="에스코어 드림 3 Light" panose="020B0303030302020204" pitchFamily="34" charset="-127"/>
+                        </a:rPr>
+                        <a:t>깃발</a:t>
+                      </a:r>
+                      <a:r>
+                        <a:rPr lang="en-US" altLang="ko-KR" sz="1500" dirty="0">
+                          <a:latin typeface="에스코어 드림 3 Light" panose="020B0303030302020204" pitchFamily="34" charset="-127"/>
+                          <a:ea typeface="에스코어 드림 3 Light" panose="020B0303030302020204" pitchFamily="34" charset="-127"/>
+                        </a:rPr>
+                        <a:t>, </a:t>
+                      </a:r>
+                      <a:r>
+                        <a:rPr lang="ko-KR" altLang="en-US" sz="1500" dirty="0">
+                          <a:latin typeface="에스코어 드림 3 Light" panose="020B0303030302020204" pitchFamily="34" charset="-127"/>
+                          <a:ea typeface="에스코어 드림 3 Light" panose="020B0303030302020204" pitchFamily="34" charset="-127"/>
+                        </a:rPr>
+                        <a:t>돌</a:t>
+                      </a:r>
+                      <a:r>
+                        <a:rPr lang="en-US" altLang="ko-KR" sz="1500" dirty="0">
+                          <a:latin typeface="에스코어 드림 3 Light" panose="020B0303030302020204" pitchFamily="34" charset="-127"/>
+                          <a:ea typeface="에스코어 드림 3 Light" panose="020B0303030302020204" pitchFamily="34" charset="-127"/>
+                        </a:rPr>
+                        <a:t>, </a:t>
+                      </a:r>
+                      <a:r>
+                        <a:rPr lang="ko-KR" altLang="en-US" sz="1500" dirty="0">
+                          <a:latin typeface="에스코어 드림 3 Light" panose="020B0303030302020204" pitchFamily="34" charset="-127"/>
+                          <a:ea typeface="에스코어 드림 3 Light" panose="020B0303030302020204" pitchFamily="34" charset="-127"/>
+                        </a:rPr>
+                        <a:t>나무</a:t>
+                      </a:r>
+                      <a:r>
+                        <a:rPr lang="en-US" altLang="ko-KR" sz="1500" dirty="0">
+                          <a:latin typeface="에스코어 드림 3 Light" panose="020B0303030302020204" pitchFamily="34" charset="-127"/>
+                          <a:ea typeface="에스코어 드림 3 Light" panose="020B0303030302020204" pitchFamily="34" charset="-127"/>
+                        </a:rPr>
+                        <a:t>) </a:t>
+                      </a:r>
+                      <a:r>
+                        <a:rPr lang="ko-KR" altLang="en-US" sz="1500" dirty="0">
+                          <a:latin typeface="에스코어 드림 3 Light" panose="020B0303030302020204" pitchFamily="34" charset="-127"/>
+                          <a:ea typeface="에스코어 드림 3 Light" panose="020B0303030302020204" pitchFamily="34" charset="-127"/>
+                        </a:rPr>
+                        <a:t>랜덤 생성 및 장애물 움직임 완료</a:t>
+                      </a:r>
                     </a:p>
                   </a:txBody>
                   <a:tcPr/>
@@ -6598,6 +4689,13 @@
                     <a:lstStyle/>
                     <a:p>
                       <a:pPr algn="ctr" latinLnBrk="1"/>
+                      <a:r>
+                        <a:rPr lang="en-US" altLang="ko-KR" sz="1800" dirty="0">
+                          <a:latin typeface="에스코어 드림 3 Light" panose="020B0303030302020204" pitchFamily="34" charset="-127"/>
+                          <a:ea typeface="에스코어 드림 3 Light" panose="020B0303030302020204" pitchFamily="34" charset="-127"/>
+                        </a:rPr>
+                        <a:t>10%</a:t>
+                      </a:r>
                       <a:endParaRPr lang="ko-KR" altLang="en-US" sz="1800" dirty="0">
                         <a:latin typeface="에스코어 드림 3 Light" panose="020B0303030302020204" pitchFamily="34" charset="-127"/>
                         <a:ea typeface="에스코어 드림 3 Light" panose="020B0303030302020204" pitchFamily="34" charset="-127"/>
@@ -7617,6 +5715,763 @@
     <p:extLst>
       <p:ext uri="{BB962C8B-B14F-4D97-AF65-F5344CB8AC3E}">
         <p14:creationId xmlns:p14="http://schemas.microsoft.com/office/powerpoint/2010/main" val="2558925623"/>
+      </p:ext>
+    </p:extLst>
+  </p:cSld>
+  <p:clrMapOvr>
+    <a:masterClrMapping/>
+  </p:clrMapOvr>
+</p:sld>
+</file>
+
+<file path=ppt/slides/slide3.xml><?xml version="1.0" encoding="utf-8"?>
+<p:sld xmlns:a="http://schemas.openxmlformats.org/drawingml/2006/main" xmlns:r="http://schemas.openxmlformats.org/officeDocument/2006/relationships" xmlns:p="http://schemas.openxmlformats.org/presentationml/2006/main">
+  <p:cSld>
+    <p:spTree>
+      <p:nvGrpSpPr>
+        <p:cNvPr id="1" name=""/>
+        <p:cNvGrpSpPr/>
+        <p:nvPr/>
+      </p:nvGrpSpPr>
+      <p:grpSpPr>
+        <a:xfrm>
+          <a:off x="0" y="0"/>
+          <a:ext cx="0" cy="0"/>
+          <a:chOff x="0" y="0"/>
+          <a:chExt cx="0" cy="0"/>
+        </a:xfrm>
+      </p:grpSpPr>
+      <p:sp>
+        <p:nvSpPr>
+          <p:cNvPr id="2" name="TextBox 1">
+            <a:extLst>
+              <a:ext uri="{FF2B5EF4-FFF2-40B4-BE49-F238E27FC236}">
+                <a16:creationId xmlns:a16="http://schemas.microsoft.com/office/drawing/2014/main" id="{7CD5D18E-745A-761B-75E2-59C5E7BAE6A6}"/>
+              </a:ext>
+            </a:extLst>
+          </p:cNvPr>
+          <p:cNvSpPr txBox="1"/>
+          <p:nvPr/>
+        </p:nvSpPr>
+        <p:spPr>
+          <a:xfrm>
+            <a:off x="295565" y="193965"/>
+            <a:ext cx="3467616" cy="646331"/>
+          </a:xfrm>
+          <a:prstGeom prst="rect">
+            <a:avLst/>
+          </a:prstGeom>
+          <a:noFill/>
+        </p:spPr>
+        <p:txBody>
+          <a:bodyPr wrap="none" rtlCol="0">
+            <a:spAutoFit/>
+          </a:bodyPr>
+          <a:lstStyle/>
+          <a:p>
+            <a:r>
+              <a:rPr lang="ko-KR" altLang="en-US" sz="3600" dirty="0">
+                <a:latin typeface="에스코어 드림 8 Heavy" panose="020B0903030302020204" pitchFamily="34" charset="-127"/>
+                <a:ea typeface="에스코어 드림 8 Heavy" panose="020B0903030302020204" pitchFamily="34" charset="-127"/>
+              </a:rPr>
+              <a:t>개발 일정 </a:t>
+            </a:r>
+            <a:r>
+              <a:rPr lang="en-US" altLang="ko-KR" sz="3600" dirty="0">
+                <a:latin typeface="에스코어 드림 8 Heavy" panose="020B0903030302020204" pitchFamily="34" charset="-127"/>
+                <a:ea typeface="에스코어 드림 8 Heavy" panose="020B0903030302020204" pitchFamily="34" charset="-127"/>
+              </a:rPr>
+              <a:t>(</a:t>
+            </a:r>
+            <a:r>
+              <a:rPr lang="ko-KR" altLang="en-US" sz="3600" dirty="0">
+                <a:latin typeface="에스코어 드림 8 Heavy" panose="020B0903030302020204" pitchFamily="34" charset="-127"/>
+                <a:ea typeface="에스코어 드림 8 Heavy" panose="020B0903030302020204" pitchFamily="34" charset="-127"/>
+              </a:rPr>
+              <a:t>수정</a:t>
+            </a:r>
+            <a:r>
+              <a:rPr lang="en-US" altLang="ko-KR" sz="3600" dirty="0">
+                <a:latin typeface="에스코어 드림 8 Heavy" panose="020B0903030302020204" pitchFamily="34" charset="-127"/>
+                <a:ea typeface="에스코어 드림 8 Heavy" panose="020B0903030302020204" pitchFamily="34" charset="-127"/>
+              </a:rPr>
+              <a:t>)</a:t>
+            </a:r>
+          </a:p>
+        </p:txBody>
+      </p:sp>
+      <p:sp>
+        <p:nvSpPr>
+          <p:cNvPr id="3" name="직사각형 2">
+            <a:extLst>
+              <a:ext uri="{FF2B5EF4-FFF2-40B4-BE49-F238E27FC236}">
+                <a16:creationId xmlns:a16="http://schemas.microsoft.com/office/drawing/2014/main" id="{AFB45B25-61AE-1829-B42B-EC2A588C7108}"/>
+              </a:ext>
+            </a:extLst>
+          </p:cNvPr>
+          <p:cNvSpPr/>
+          <p:nvPr/>
+        </p:nvSpPr>
+        <p:spPr>
+          <a:xfrm>
+            <a:off x="-1" y="221673"/>
+            <a:ext cx="166255" cy="655782"/>
+          </a:xfrm>
+          <a:prstGeom prst="rect">
+            <a:avLst/>
+          </a:prstGeom>
+          <a:solidFill>
+            <a:srgbClr val="A3D0EB"/>
+          </a:solidFill>
+          <a:ln>
+            <a:solidFill>
+              <a:srgbClr val="A3D0EB"/>
+            </a:solidFill>
+          </a:ln>
+        </p:spPr>
+        <p:style>
+          <a:lnRef idx="2">
+            <a:schemeClr val="accent1">
+              <a:shade val="15000"/>
+            </a:schemeClr>
+          </a:lnRef>
+          <a:fillRef idx="1">
+            <a:schemeClr val="accent1"/>
+          </a:fillRef>
+          <a:effectRef idx="0">
+            <a:schemeClr val="accent1"/>
+          </a:effectRef>
+          <a:fontRef idx="minor">
+            <a:schemeClr val="lt1"/>
+          </a:fontRef>
+        </p:style>
+        <p:txBody>
+          <a:bodyPr rtlCol="0" anchor="ctr"/>
+          <a:lstStyle/>
+          <a:p>
+            <a:pPr algn="ctr"/>
+            <a:endParaRPr lang="ko-KR" altLang="en-US"/>
+          </a:p>
+        </p:txBody>
+      </p:sp>
+      <p:sp>
+        <p:nvSpPr>
+          <p:cNvPr id="4" name="TextBox 3">
+            <a:extLst>
+              <a:ext uri="{FF2B5EF4-FFF2-40B4-BE49-F238E27FC236}">
+                <a16:creationId xmlns:a16="http://schemas.microsoft.com/office/drawing/2014/main" id="{D6798DA1-6891-83A0-1BEE-264357304621}"/>
+              </a:ext>
+            </a:extLst>
+          </p:cNvPr>
+          <p:cNvSpPr txBox="1"/>
+          <p:nvPr/>
+        </p:nvSpPr>
+        <p:spPr>
+          <a:xfrm>
+            <a:off x="2193926" y="1029887"/>
+            <a:ext cx="7136890" cy="1107996"/>
+          </a:xfrm>
+          <a:prstGeom prst="rect">
+            <a:avLst/>
+          </a:prstGeom>
+          <a:noFill/>
+        </p:spPr>
+        <p:txBody>
+          <a:bodyPr wrap="none" rtlCol="0">
+            <a:spAutoFit/>
+          </a:bodyPr>
+          <a:lstStyle/>
+          <a:p>
+            <a:r>
+              <a:rPr lang="en-US" altLang="ko-KR" sz="3300" dirty="0">
+                <a:latin typeface="에스코어 드림 7 ExtraBold" panose="020B0803030302020204" pitchFamily="34" charset="-127"/>
+                <a:ea typeface="에스코어 드림 7 ExtraBold" panose="020B0803030302020204" pitchFamily="34" charset="-127"/>
+              </a:rPr>
+              <a:t>1</a:t>
+            </a:r>
+            <a:r>
+              <a:rPr lang="ko-KR" altLang="en-US" sz="3300" dirty="0">
+                <a:latin typeface="에스코어 드림 7 ExtraBold" panose="020B0803030302020204" pitchFamily="34" charset="-127"/>
+                <a:ea typeface="에스코어 드림 7 ExtraBold" panose="020B0803030302020204" pitchFamily="34" charset="-127"/>
+              </a:rPr>
+              <a:t>주차 </a:t>
+            </a:r>
+            <a:r>
+              <a:rPr lang="en-US" altLang="ko-KR" sz="3300" dirty="0">
+                <a:latin typeface="에스코어 드림 7 ExtraBold" panose="020B0803030302020204" pitchFamily="34" charset="-127"/>
+                <a:ea typeface="에스코어 드림 7 ExtraBold" panose="020B0803030302020204" pitchFamily="34" charset="-127"/>
+              </a:rPr>
+              <a:t>: </a:t>
+            </a:r>
+            <a:r>
+              <a:rPr lang="ko-KR" altLang="en-US" sz="3300" dirty="0">
+                <a:latin typeface="에스코어 드림 7 ExtraBold" panose="020B0803030302020204" pitchFamily="34" charset="-127"/>
+                <a:ea typeface="에스코어 드림 7 ExtraBold" panose="020B0803030302020204" pitchFamily="34" charset="-127"/>
+              </a:rPr>
+              <a:t>게임 제작 관련 리소스 수집 및</a:t>
+            </a:r>
+            <a:endParaRPr lang="en-US" altLang="ko-KR" sz="3300" dirty="0">
+              <a:latin typeface="에스코어 드림 7 ExtraBold" panose="020B0803030302020204" pitchFamily="34" charset="-127"/>
+              <a:ea typeface="에스코어 드림 7 ExtraBold" panose="020B0803030302020204" pitchFamily="34" charset="-127"/>
+            </a:endParaRPr>
+          </a:p>
+          <a:p>
+            <a:r>
+              <a:rPr lang="en-US" altLang="ko-KR" sz="3300" dirty="0">
+                <a:latin typeface="에스코어 드림 7 ExtraBold" panose="020B0803030302020204" pitchFamily="34" charset="-127"/>
+                <a:ea typeface="에스코어 드림 7 ExtraBold" panose="020B0803030302020204" pitchFamily="34" charset="-127"/>
+              </a:rPr>
+              <a:t>		</a:t>
+            </a:r>
+            <a:r>
+              <a:rPr lang="ko-KR" altLang="en-US" sz="3300" dirty="0">
+                <a:latin typeface="에스코어 드림 7 ExtraBold" panose="020B0803030302020204" pitchFamily="34" charset="-127"/>
+                <a:ea typeface="에스코어 드림 7 ExtraBold" panose="020B0803030302020204" pitchFamily="34" charset="-127"/>
+              </a:rPr>
+              <a:t>이미지 로드</a:t>
+            </a:r>
+            <a:endParaRPr lang="en-US" altLang="ko-KR" sz="3300" dirty="0">
+              <a:latin typeface="에스코어 드림 7 ExtraBold" panose="020B0803030302020204" pitchFamily="34" charset="-127"/>
+              <a:ea typeface="에스코어 드림 7 ExtraBold" panose="020B0803030302020204" pitchFamily="34" charset="-127"/>
+            </a:endParaRPr>
+          </a:p>
+        </p:txBody>
+      </p:sp>
+      <p:sp>
+        <p:nvSpPr>
+          <p:cNvPr id="5" name="TextBox 4">
+            <a:extLst>
+              <a:ext uri="{FF2B5EF4-FFF2-40B4-BE49-F238E27FC236}">
+                <a16:creationId xmlns:a16="http://schemas.microsoft.com/office/drawing/2014/main" id="{4421CD05-183E-0C7B-126A-073781938F4F}"/>
+              </a:ext>
+            </a:extLst>
+          </p:cNvPr>
+          <p:cNvSpPr txBox="1"/>
+          <p:nvPr/>
+        </p:nvSpPr>
+        <p:spPr>
+          <a:xfrm>
+            <a:off x="2193926" y="2278646"/>
+            <a:ext cx="6075702" cy="1107996"/>
+          </a:xfrm>
+          <a:prstGeom prst="rect">
+            <a:avLst/>
+          </a:prstGeom>
+          <a:noFill/>
+        </p:spPr>
+        <p:txBody>
+          <a:bodyPr wrap="none" rtlCol="0">
+            <a:spAutoFit/>
+          </a:bodyPr>
+          <a:lstStyle/>
+          <a:p>
+            <a:r>
+              <a:rPr lang="en-US" altLang="ko-KR" sz="3300" dirty="0">
+                <a:latin typeface="에스코어 드림 7 ExtraBold" panose="020B0803030302020204" pitchFamily="34" charset="-127"/>
+                <a:ea typeface="에스코어 드림 7 ExtraBold" panose="020B0803030302020204" pitchFamily="34" charset="-127"/>
+              </a:rPr>
+              <a:t>2</a:t>
+            </a:r>
+            <a:r>
+              <a:rPr lang="ko-KR" altLang="en-US" sz="3300" dirty="0">
+                <a:latin typeface="에스코어 드림 7 ExtraBold" panose="020B0803030302020204" pitchFamily="34" charset="-127"/>
+                <a:ea typeface="에스코어 드림 7 ExtraBold" panose="020B0803030302020204" pitchFamily="34" charset="-127"/>
+              </a:rPr>
+              <a:t>주차 </a:t>
+            </a:r>
+            <a:r>
+              <a:rPr lang="en-US" altLang="ko-KR" sz="3300" dirty="0">
+                <a:latin typeface="에스코어 드림 7 ExtraBold" panose="020B0803030302020204" pitchFamily="34" charset="-127"/>
+                <a:ea typeface="에스코어 드림 7 ExtraBold" panose="020B0803030302020204" pitchFamily="34" charset="-127"/>
+              </a:rPr>
+              <a:t>: </a:t>
+            </a:r>
+            <a:r>
+              <a:rPr lang="ko-KR" altLang="en-US" sz="3300" dirty="0">
+                <a:latin typeface="에스코어 드림 7 ExtraBold" panose="020B0803030302020204" pitchFamily="34" charset="-127"/>
+                <a:ea typeface="에스코어 드림 7 ExtraBold" panose="020B0803030302020204" pitchFamily="34" charset="-127"/>
+              </a:rPr>
+              <a:t>게임의 전반적인 틀 잡기</a:t>
+            </a:r>
+            <a:endParaRPr lang="en-US" altLang="ko-KR" sz="3300" dirty="0">
+              <a:latin typeface="에스코어 드림 7 ExtraBold" panose="020B0803030302020204" pitchFamily="34" charset="-127"/>
+              <a:ea typeface="에스코어 드림 7 ExtraBold" panose="020B0803030302020204" pitchFamily="34" charset="-127"/>
+            </a:endParaRPr>
+          </a:p>
+          <a:p>
+            <a:r>
+              <a:rPr lang="en-US" altLang="ko-KR" sz="3300" dirty="0">
+                <a:latin typeface="에스코어 드림 7 ExtraBold" panose="020B0803030302020204" pitchFamily="34" charset="-127"/>
+                <a:ea typeface="에스코어 드림 7 ExtraBold" panose="020B0803030302020204" pitchFamily="34" charset="-127"/>
+              </a:rPr>
+              <a:t>	    (</a:t>
+            </a:r>
+            <a:r>
+              <a:rPr lang="ko-KR" altLang="en-US" sz="3300" dirty="0">
+                <a:latin typeface="에스코어 드림 7 ExtraBold" panose="020B0803030302020204" pitchFamily="34" charset="-127"/>
+                <a:ea typeface="에스코어 드림 7 ExtraBold" panose="020B0803030302020204" pitchFamily="34" charset="-127"/>
+              </a:rPr>
+              <a:t>추상화 및 클래스 생성</a:t>
+            </a:r>
+            <a:r>
+              <a:rPr lang="en-US" altLang="ko-KR" sz="3300" dirty="0">
+                <a:latin typeface="에스코어 드림 7 ExtraBold" panose="020B0803030302020204" pitchFamily="34" charset="-127"/>
+                <a:ea typeface="에스코어 드림 7 ExtraBold" panose="020B0803030302020204" pitchFamily="34" charset="-127"/>
+              </a:rPr>
+              <a:t>)</a:t>
+            </a:r>
+          </a:p>
+        </p:txBody>
+      </p:sp>
+      <p:sp>
+        <p:nvSpPr>
+          <p:cNvPr id="8" name="TextBox 7">
+            <a:extLst>
+              <a:ext uri="{FF2B5EF4-FFF2-40B4-BE49-F238E27FC236}">
+                <a16:creationId xmlns:a16="http://schemas.microsoft.com/office/drawing/2014/main" id="{095DA470-E9B3-21A7-2650-3DB2451AC9D1}"/>
+              </a:ext>
+            </a:extLst>
+          </p:cNvPr>
+          <p:cNvSpPr txBox="1"/>
+          <p:nvPr/>
+        </p:nvSpPr>
+        <p:spPr>
+          <a:xfrm>
+            <a:off x="2193926" y="3659833"/>
+            <a:ext cx="7136890" cy="600164"/>
+          </a:xfrm>
+          <a:prstGeom prst="rect">
+            <a:avLst/>
+          </a:prstGeom>
+          <a:noFill/>
+        </p:spPr>
+        <p:txBody>
+          <a:bodyPr wrap="none" rtlCol="0">
+            <a:spAutoFit/>
+          </a:bodyPr>
+          <a:lstStyle/>
+          <a:p>
+            <a:r>
+              <a:rPr lang="en-US" altLang="ko-KR" sz="3300" dirty="0">
+                <a:latin typeface="에스코어 드림 7 ExtraBold" panose="020B0803030302020204" pitchFamily="34" charset="-127"/>
+                <a:ea typeface="에스코어 드림 7 ExtraBold" panose="020B0803030302020204" pitchFamily="34" charset="-127"/>
+              </a:rPr>
+              <a:t>3</a:t>
+            </a:r>
+            <a:r>
+              <a:rPr lang="ko-KR" altLang="en-US" sz="3300" dirty="0">
+                <a:latin typeface="에스코어 드림 7 ExtraBold" panose="020B0803030302020204" pitchFamily="34" charset="-127"/>
+                <a:ea typeface="에스코어 드림 7 ExtraBold" panose="020B0803030302020204" pitchFamily="34" charset="-127"/>
+              </a:rPr>
+              <a:t>주차 </a:t>
+            </a:r>
+            <a:r>
+              <a:rPr lang="en-US" altLang="ko-KR" sz="3300" dirty="0">
+                <a:latin typeface="에스코어 드림 7 ExtraBold" panose="020B0803030302020204" pitchFamily="34" charset="-127"/>
+                <a:ea typeface="에스코어 드림 7 ExtraBold" panose="020B0803030302020204" pitchFamily="34" charset="-127"/>
+              </a:rPr>
+              <a:t>: </a:t>
+            </a:r>
+            <a:r>
+              <a:rPr lang="ko-KR" altLang="en-US" sz="3300" dirty="0">
+                <a:solidFill>
+                  <a:srgbClr val="FF0000"/>
+                </a:solidFill>
+                <a:latin typeface="에스코어 드림 7 ExtraBold" panose="020B0803030302020204" pitchFamily="34" charset="-127"/>
+                <a:ea typeface="에스코어 드림 7 ExtraBold" panose="020B0803030302020204" pitchFamily="34" charset="-127"/>
+              </a:rPr>
+              <a:t>로비 화면 </a:t>
+            </a:r>
+            <a:r>
+              <a:rPr lang="ko-KR" altLang="en-US" sz="3300" dirty="0">
+                <a:latin typeface="에스코어 드림 7 ExtraBold" panose="020B0803030302020204" pitchFamily="34" charset="-127"/>
+                <a:ea typeface="에스코어 드림 7 ExtraBold" panose="020B0803030302020204" pitchFamily="34" charset="-127"/>
+              </a:rPr>
+              <a:t>및 장애물 </a:t>
+            </a:r>
+            <a:r>
+              <a:rPr lang="ko-KR" altLang="en-US" sz="3300" dirty="0">
+                <a:solidFill>
+                  <a:srgbClr val="FF0000"/>
+                </a:solidFill>
+                <a:latin typeface="에스코어 드림 7 ExtraBold" panose="020B0803030302020204" pitchFamily="34" charset="-127"/>
+                <a:ea typeface="에스코어 드림 7 ExtraBold" panose="020B0803030302020204" pitchFamily="34" charset="-127"/>
+              </a:rPr>
+              <a:t>일부</a:t>
+            </a:r>
+            <a:r>
+              <a:rPr lang="ko-KR" altLang="en-US" sz="3300" dirty="0">
+                <a:latin typeface="에스코어 드림 7 ExtraBold" panose="020B0803030302020204" pitchFamily="34" charset="-127"/>
+                <a:ea typeface="에스코어 드림 7 ExtraBold" panose="020B0803030302020204" pitchFamily="34" charset="-127"/>
+              </a:rPr>
+              <a:t> 구현</a:t>
+            </a:r>
+            <a:endParaRPr lang="en-US" altLang="ko-KR" sz="3300" dirty="0">
+              <a:latin typeface="에스코어 드림 7 ExtraBold" panose="020B0803030302020204" pitchFamily="34" charset="-127"/>
+              <a:ea typeface="에스코어 드림 7 ExtraBold" panose="020B0803030302020204" pitchFamily="34" charset="-127"/>
+            </a:endParaRPr>
+          </a:p>
+        </p:txBody>
+      </p:sp>
+      <p:sp>
+        <p:nvSpPr>
+          <p:cNvPr id="10" name="TextBox 9">
+            <a:extLst>
+              <a:ext uri="{FF2B5EF4-FFF2-40B4-BE49-F238E27FC236}">
+                <a16:creationId xmlns:a16="http://schemas.microsoft.com/office/drawing/2014/main" id="{C1DCCA99-AB91-3823-AB9C-4D6580F57C45}"/>
+              </a:ext>
+            </a:extLst>
+          </p:cNvPr>
+          <p:cNvSpPr txBox="1"/>
+          <p:nvPr/>
+        </p:nvSpPr>
+        <p:spPr>
+          <a:xfrm>
+            <a:off x="2101562" y="4533188"/>
+            <a:ext cx="7358105" cy="1107996"/>
+          </a:xfrm>
+          <a:prstGeom prst="rect">
+            <a:avLst/>
+          </a:prstGeom>
+          <a:noFill/>
+        </p:spPr>
+        <p:txBody>
+          <a:bodyPr wrap="none" rtlCol="0">
+            <a:spAutoFit/>
+          </a:bodyPr>
+          <a:lstStyle/>
+          <a:p>
+            <a:r>
+              <a:rPr lang="en-US" altLang="ko-KR" sz="3300" dirty="0">
+                <a:solidFill>
+                  <a:srgbClr val="FF0000"/>
+                </a:solidFill>
+                <a:latin typeface="에스코어 드림 7 ExtraBold" panose="020B0803030302020204" pitchFamily="34" charset="-127"/>
+                <a:ea typeface="에스코어 드림 7 ExtraBold" panose="020B0803030302020204" pitchFamily="34" charset="-127"/>
+              </a:rPr>
+              <a:t>4</a:t>
+            </a:r>
+            <a:r>
+              <a:rPr lang="en-US" altLang="ko-KR" sz="3300" dirty="0">
+                <a:latin typeface="에스코어 드림 7 ExtraBold" panose="020B0803030302020204" pitchFamily="34" charset="-127"/>
+                <a:ea typeface="에스코어 드림 7 ExtraBold" panose="020B0803030302020204" pitchFamily="34" charset="-127"/>
+              </a:rPr>
+              <a:t>~7</a:t>
+            </a:r>
+            <a:r>
+              <a:rPr lang="ko-KR" altLang="en-US" sz="3300" dirty="0">
+                <a:latin typeface="에스코어 드림 7 ExtraBold" panose="020B0803030302020204" pitchFamily="34" charset="-127"/>
+                <a:ea typeface="에스코어 드림 7 ExtraBold" panose="020B0803030302020204" pitchFamily="34" charset="-127"/>
+              </a:rPr>
+              <a:t>주차 </a:t>
+            </a:r>
+            <a:r>
+              <a:rPr lang="en-US" altLang="ko-KR" sz="3300" dirty="0">
+                <a:latin typeface="에스코어 드림 7 ExtraBold" panose="020B0803030302020204" pitchFamily="34" charset="-127"/>
+                <a:ea typeface="에스코어 드림 7 ExtraBold" panose="020B0803030302020204" pitchFamily="34" charset="-127"/>
+              </a:rPr>
+              <a:t>: </a:t>
+            </a:r>
+            <a:r>
+              <a:rPr lang="ko-KR" altLang="en-US" sz="3300" dirty="0">
+                <a:latin typeface="에스코어 드림 7 ExtraBold" panose="020B0803030302020204" pitchFamily="34" charset="-127"/>
+                <a:ea typeface="에스코어 드림 7 ExtraBold" panose="020B0803030302020204" pitchFamily="34" charset="-127"/>
+              </a:rPr>
+              <a:t>캐릭터 컨트롤러 구현  및</a:t>
+            </a:r>
+            <a:endParaRPr lang="en-US" altLang="ko-KR" sz="3300" dirty="0">
+              <a:latin typeface="에스코어 드림 7 ExtraBold" panose="020B0803030302020204" pitchFamily="34" charset="-127"/>
+              <a:ea typeface="에스코어 드림 7 ExtraBold" panose="020B0803030302020204" pitchFamily="34" charset="-127"/>
+            </a:endParaRPr>
+          </a:p>
+          <a:p>
+            <a:r>
+              <a:rPr lang="en-US" altLang="ko-KR" sz="3300" dirty="0">
+                <a:latin typeface="에스코어 드림 7 ExtraBold" panose="020B0803030302020204" pitchFamily="34" charset="-127"/>
+                <a:ea typeface="에스코어 드림 7 ExtraBold" panose="020B0803030302020204" pitchFamily="34" charset="-127"/>
+              </a:rPr>
+              <a:t>			</a:t>
+            </a:r>
+            <a:r>
+              <a:rPr lang="ko-KR" altLang="en-US" sz="3300" dirty="0">
+                <a:latin typeface="에스코어 드림 7 ExtraBold" panose="020B0803030302020204" pitchFamily="34" charset="-127"/>
+                <a:ea typeface="에스코어 드림 7 ExtraBold" panose="020B0803030302020204" pitchFamily="34" charset="-127"/>
+              </a:rPr>
+              <a:t>충돌 처리 </a:t>
+            </a:r>
+            <a:r>
+              <a:rPr lang="en-US" altLang="ko-KR" sz="3300" dirty="0">
+                <a:solidFill>
+                  <a:srgbClr val="FF0000"/>
+                </a:solidFill>
+                <a:latin typeface="에스코어 드림 7 ExtraBold" panose="020B0803030302020204" pitchFamily="34" charset="-127"/>
+                <a:ea typeface="에스코어 드림 7 ExtraBold" panose="020B0803030302020204" pitchFamily="34" charset="-127"/>
+              </a:rPr>
+              <a:t>+ </a:t>
+            </a:r>
+            <a:r>
+              <a:rPr lang="ko-KR" altLang="en-US" sz="3300" dirty="0">
+                <a:solidFill>
+                  <a:srgbClr val="FF0000"/>
+                </a:solidFill>
+                <a:latin typeface="에스코어 드림 7 ExtraBold" panose="020B0803030302020204" pitchFamily="34" charset="-127"/>
+                <a:ea typeface="에스코어 드림 7 ExtraBold" panose="020B0803030302020204" pitchFamily="34" charset="-127"/>
+              </a:rPr>
+              <a:t>장애물 구현</a:t>
+            </a:r>
+            <a:endParaRPr lang="en-US" altLang="ko-KR" sz="3300" dirty="0">
+              <a:solidFill>
+                <a:srgbClr val="FF0000"/>
+              </a:solidFill>
+              <a:latin typeface="에스코어 드림 7 ExtraBold" panose="020B0803030302020204" pitchFamily="34" charset="-127"/>
+              <a:ea typeface="에스코어 드림 7 ExtraBold" panose="020B0803030302020204" pitchFamily="34" charset="-127"/>
+            </a:endParaRPr>
+          </a:p>
+        </p:txBody>
+      </p:sp>
+      <p:sp>
+        <p:nvSpPr>
+          <p:cNvPr id="15" name="TextBox 14">
+            <a:extLst>
+              <a:ext uri="{FF2B5EF4-FFF2-40B4-BE49-F238E27FC236}">
+                <a16:creationId xmlns:a16="http://schemas.microsoft.com/office/drawing/2014/main" id="{265392A2-4E98-D0AA-EB1A-993FABC12B75}"/>
+              </a:ext>
+            </a:extLst>
+          </p:cNvPr>
+          <p:cNvSpPr txBox="1"/>
+          <p:nvPr/>
+        </p:nvSpPr>
+        <p:spPr>
+          <a:xfrm>
+            <a:off x="2193926" y="5828113"/>
+            <a:ext cx="6311343" cy="600164"/>
+          </a:xfrm>
+          <a:prstGeom prst="rect">
+            <a:avLst/>
+          </a:prstGeom>
+          <a:noFill/>
+        </p:spPr>
+        <p:txBody>
+          <a:bodyPr wrap="none" rtlCol="0">
+            <a:spAutoFit/>
+          </a:bodyPr>
+          <a:lstStyle/>
+          <a:p>
+            <a:r>
+              <a:rPr lang="en-US" altLang="ko-KR" sz="3300" dirty="0">
+                <a:latin typeface="에스코어 드림 7 ExtraBold" panose="020B0803030302020204" pitchFamily="34" charset="-127"/>
+                <a:ea typeface="에스코어 드림 7 ExtraBold" panose="020B0803030302020204" pitchFamily="34" charset="-127"/>
+              </a:rPr>
+              <a:t>7~8</a:t>
+            </a:r>
+            <a:r>
+              <a:rPr lang="ko-KR" altLang="en-US" sz="3300" dirty="0">
+                <a:latin typeface="에스코어 드림 7 ExtraBold" panose="020B0803030302020204" pitchFamily="34" charset="-127"/>
+                <a:ea typeface="에스코어 드림 7 ExtraBold" panose="020B0803030302020204" pitchFamily="34" charset="-127"/>
+              </a:rPr>
+              <a:t>주차 </a:t>
+            </a:r>
+            <a:r>
+              <a:rPr lang="en-US" altLang="ko-KR" sz="3300" dirty="0">
+                <a:latin typeface="에스코어 드림 7 ExtraBold" panose="020B0803030302020204" pitchFamily="34" charset="-127"/>
+                <a:ea typeface="에스코어 드림 7 ExtraBold" panose="020B0803030302020204" pitchFamily="34" charset="-127"/>
+              </a:rPr>
+              <a:t>: </a:t>
+            </a:r>
+            <a:r>
+              <a:rPr lang="ko-KR" altLang="en-US" sz="3300" dirty="0">
+                <a:latin typeface="에스코어 드림 7 ExtraBold" panose="020B0803030302020204" pitchFamily="34" charset="-127"/>
+                <a:ea typeface="에스코어 드림 7 ExtraBold" panose="020B0803030302020204" pitchFamily="34" charset="-127"/>
+              </a:rPr>
+              <a:t>오류 수정 및 코드 정리</a:t>
+            </a:r>
+            <a:endParaRPr lang="en-US" altLang="ko-KR" sz="3300" dirty="0">
+              <a:latin typeface="에스코어 드림 7 ExtraBold" panose="020B0803030302020204" pitchFamily="34" charset="-127"/>
+              <a:ea typeface="에스코어 드림 7 ExtraBold" panose="020B0803030302020204" pitchFamily="34" charset="-127"/>
+            </a:endParaRPr>
+          </a:p>
+        </p:txBody>
+      </p:sp>
+    </p:spTree>
+    <p:extLst>
+      <p:ext uri="{BB962C8B-B14F-4D97-AF65-F5344CB8AC3E}">
+        <p14:creationId xmlns:p14="http://schemas.microsoft.com/office/powerpoint/2010/main" val="3639812719"/>
+      </p:ext>
+    </p:extLst>
+  </p:cSld>
+  <p:clrMapOvr>
+    <a:masterClrMapping/>
+  </p:clrMapOvr>
+</p:sld>
+</file>
+
+<file path=ppt/slides/slide4.xml><?xml version="1.0" encoding="utf-8"?>
+<p:sld xmlns:a="http://schemas.openxmlformats.org/drawingml/2006/main" xmlns:r="http://schemas.openxmlformats.org/officeDocument/2006/relationships" xmlns:p="http://schemas.openxmlformats.org/presentationml/2006/main">
+  <p:cSld>
+    <p:spTree>
+      <p:nvGrpSpPr>
+        <p:cNvPr id="1" name=""/>
+        <p:cNvGrpSpPr/>
+        <p:nvPr/>
+      </p:nvGrpSpPr>
+      <p:grpSpPr>
+        <a:xfrm>
+          <a:off x="0" y="0"/>
+          <a:ext cx="0" cy="0"/>
+          <a:chOff x="0" y="0"/>
+          <a:chExt cx="0" cy="0"/>
+        </a:xfrm>
+      </p:grpSpPr>
+      <p:sp>
+        <p:nvSpPr>
+          <p:cNvPr id="2" name="TextBox 1">
+            <a:extLst>
+              <a:ext uri="{FF2B5EF4-FFF2-40B4-BE49-F238E27FC236}">
+                <a16:creationId xmlns:a16="http://schemas.microsoft.com/office/drawing/2014/main" id="{7CD5D18E-745A-761B-75E2-59C5E7BAE6A6}"/>
+              </a:ext>
+            </a:extLst>
+          </p:cNvPr>
+          <p:cNvSpPr txBox="1"/>
+          <p:nvPr/>
+        </p:nvSpPr>
+        <p:spPr>
+          <a:xfrm>
+            <a:off x="295565" y="193965"/>
+            <a:ext cx="6791539" cy="646331"/>
+          </a:xfrm>
+          <a:prstGeom prst="rect">
+            <a:avLst/>
+          </a:prstGeom>
+          <a:noFill/>
+        </p:spPr>
+        <p:txBody>
+          <a:bodyPr wrap="none" rtlCol="0">
+            <a:spAutoFit/>
+          </a:bodyPr>
+          <a:lstStyle/>
+          <a:p>
+            <a:r>
+              <a:rPr lang="en-US" altLang="ko-KR" sz="3600" dirty="0" err="1">
+                <a:latin typeface="에스코어 드림 8 Heavy" panose="020B0903030302020204" pitchFamily="34" charset="-127"/>
+                <a:ea typeface="에스코어 드림 8 Heavy" panose="020B0903030302020204" pitchFamily="34" charset="-127"/>
+              </a:rPr>
+              <a:t>Github</a:t>
+            </a:r>
+            <a:r>
+              <a:rPr lang="en-US" altLang="ko-KR" sz="3600" dirty="0">
+                <a:latin typeface="에스코어 드림 8 Heavy" panose="020B0903030302020204" pitchFamily="34" charset="-127"/>
+                <a:ea typeface="에스코어 드림 8 Heavy" panose="020B0903030302020204" pitchFamily="34" charset="-127"/>
+              </a:rPr>
+              <a:t> commits </a:t>
+            </a:r>
+            <a:r>
+              <a:rPr lang="ko-KR" altLang="en-US" sz="3600" dirty="0">
+                <a:latin typeface="에스코어 드림 8 Heavy" panose="020B0903030302020204" pitchFamily="34" charset="-127"/>
+                <a:ea typeface="에스코어 드림 8 Heavy" panose="020B0903030302020204" pitchFamily="34" charset="-127"/>
+              </a:rPr>
+              <a:t>통계 스크린샷</a:t>
+            </a:r>
+            <a:endParaRPr lang="en-US" altLang="ko-KR" sz="3600" dirty="0">
+              <a:latin typeface="에스코어 드림 8 Heavy" panose="020B0903030302020204" pitchFamily="34" charset="-127"/>
+              <a:ea typeface="에스코어 드림 8 Heavy" panose="020B0903030302020204" pitchFamily="34" charset="-127"/>
+            </a:endParaRPr>
+          </a:p>
+        </p:txBody>
+      </p:sp>
+      <p:sp>
+        <p:nvSpPr>
+          <p:cNvPr id="3" name="직사각형 2">
+            <a:extLst>
+              <a:ext uri="{FF2B5EF4-FFF2-40B4-BE49-F238E27FC236}">
+                <a16:creationId xmlns:a16="http://schemas.microsoft.com/office/drawing/2014/main" id="{AFB45B25-61AE-1829-B42B-EC2A588C7108}"/>
+              </a:ext>
+            </a:extLst>
+          </p:cNvPr>
+          <p:cNvSpPr/>
+          <p:nvPr/>
+        </p:nvSpPr>
+        <p:spPr>
+          <a:xfrm>
+            <a:off x="-1" y="221673"/>
+            <a:ext cx="166255" cy="655782"/>
+          </a:xfrm>
+          <a:prstGeom prst="rect">
+            <a:avLst/>
+          </a:prstGeom>
+          <a:solidFill>
+            <a:srgbClr val="A3D0EB"/>
+          </a:solidFill>
+          <a:ln>
+            <a:solidFill>
+              <a:srgbClr val="A3D0EB"/>
+            </a:solidFill>
+          </a:ln>
+        </p:spPr>
+        <p:style>
+          <a:lnRef idx="2">
+            <a:schemeClr val="accent1">
+              <a:shade val="15000"/>
+            </a:schemeClr>
+          </a:lnRef>
+          <a:fillRef idx="1">
+            <a:schemeClr val="accent1"/>
+          </a:fillRef>
+          <a:effectRef idx="0">
+            <a:schemeClr val="accent1"/>
+          </a:effectRef>
+          <a:fontRef idx="minor">
+            <a:schemeClr val="lt1"/>
+          </a:fontRef>
+        </p:style>
+        <p:txBody>
+          <a:bodyPr rtlCol="0" anchor="ctr"/>
+          <a:lstStyle/>
+          <a:p>
+            <a:pPr algn="ctr"/>
+            <a:endParaRPr lang="ko-KR" altLang="en-US"/>
+          </a:p>
+        </p:txBody>
+      </p:sp>
+      <p:pic>
+        <p:nvPicPr>
+          <p:cNvPr id="5" name="그림 4">
+            <a:extLst>
+              <a:ext uri="{FF2B5EF4-FFF2-40B4-BE49-F238E27FC236}">
+                <a16:creationId xmlns:a16="http://schemas.microsoft.com/office/drawing/2014/main" id="{7B1D1056-6DE8-6B62-CC66-0F68A1E61A36}"/>
+              </a:ext>
+            </a:extLst>
+          </p:cNvPr>
+          <p:cNvPicPr>
+            <a:picLocks noChangeAspect="1"/>
+          </p:cNvPicPr>
+          <p:nvPr/>
+        </p:nvPicPr>
+        <p:blipFill>
+          <a:blip r:embed="rId2">
+            <a:extLst>
+              <a:ext uri="{28A0092B-C50C-407E-A947-70E740481C1C}">
+                <a14:useLocalDpi xmlns:a14="http://schemas.microsoft.com/office/drawing/2010/main" val="0"/>
+              </a:ext>
+            </a:extLst>
+          </a:blip>
+          <a:stretch>
+            <a:fillRect/>
+          </a:stretch>
+        </p:blipFill>
+        <p:spPr>
+          <a:xfrm>
+            <a:off x="0" y="1436639"/>
+            <a:ext cx="12192000" cy="4519558"/>
+          </a:xfrm>
+          <a:prstGeom prst="rect">
+            <a:avLst/>
+          </a:prstGeom>
+        </p:spPr>
+      </p:pic>
+    </p:spTree>
+    <p:extLst>
+      <p:ext uri="{BB962C8B-B14F-4D97-AF65-F5344CB8AC3E}">
+        <p14:creationId xmlns:p14="http://schemas.microsoft.com/office/powerpoint/2010/main" val="2558426026"/>
       </p:ext>
     </p:extLst>
   </p:cSld>

</xml_diff>